<commit_message>
Add DG for Command and Storage component
</commit_message>
<xml_diff>
--- a/UML_Diagrams.pptx
+++ b/UML_Diagrams.pptx
@@ -9,6 +9,8 @@
     <p:sldId id="259" r:id="rId3"/>
     <p:sldId id="257" r:id="rId4"/>
     <p:sldId id="258" r:id="rId5"/>
+    <p:sldId id="260" r:id="rId6"/>
+    <p:sldId id="261" r:id="rId7"/>
   </p:sldIdLst>
   <p:sldSz cx="12192000" cy="6858000"/>
   <p:notesSz cx="6858000" cy="9144000"/>
@@ -264,7 +266,7 @@
           <a:p>
             <a:fld id="{756B03D5-F1B6-433B-AEBF-A0D421B4E27D}" type="datetimeFigureOut">
               <a:rPr lang="en-SG" smtClean="0"/>
-              <a:t>22/3/2022</a:t>
+              <a:t>23/3/2022</a:t>
             </a:fld>
             <a:endParaRPr lang="en-SG"/>
           </a:p>
@@ -464,7 +466,7 @@
           <a:p>
             <a:fld id="{756B03D5-F1B6-433B-AEBF-A0D421B4E27D}" type="datetimeFigureOut">
               <a:rPr lang="en-SG" smtClean="0"/>
-              <a:t>22/3/2022</a:t>
+              <a:t>23/3/2022</a:t>
             </a:fld>
             <a:endParaRPr lang="en-SG"/>
           </a:p>
@@ -674,7 +676,7 @@
           <a:p>
             <a:fld id="{756B03D5-F1B6-433B-AEBF-A0D421B4E27D}" type="datetimeFigureOut">
               <a:rPr lang="en-SG" smtClean="0"/>
-              <a:t>22/3/2022</a:t>
+              <a:t>23/3/2022</a:t>
             </a:fld>
             <a:endParaRPr lang="en-SG"/>
           </a:p>
@@ -874,7 +876,7 @@
           <a:p>
             <a:fld id="{756B03D5-F1B6-433B-AEBF-A0D421B4E27D}" type="datetimeFigureOut">
               <a:rPr lang="en-SG" smtClean="0"/>
-              <a:t>22/3/2022</a:t>
+              <a:t>23/3/2022</a:t>
             </a:fld>
             <a:endParaRPr lang="en-SG"/>
           </a:p>
@@ -1150,7 +1152,7 @@
           <a:p>
             <a:fld id="{756B03D5-F1B6-433B-AEBF-A0D421B4E27D}" type="datetimeFigureOut">
               <a:rPr lang="en-SG" smtClean="0"/>
-              <a:t>22/3/2022</a:t>
+              <a:t>23/3/2022</a:t>
             </a:fld>
             <a:endParaRPr lang="en-SG"/>
           </a:p>
@@ -1418,7 +1420,7 @@
           <a:p>
             <a:fld id="{756B03D5-F1B6-433B-AEBF-A0D421B4E27D}" type="datetimeFigureOut">
               <a:rPr lang="en-SG" smtClean="0"/>
-              <a:t>22/3/2022</a:t>
+              <a:t>23/3/2022</a:t>
             </a:fld>
             <a:endParaRPr lang="en-SG"/>
           </a:p>
@@ -1833,7 +1835,7 @@
           <a:p>
             <a:fld id="{756B03D5-F1B6-433B-AEBF-A0D421B4E27D}" type="datetimeFigureOut">
               <a:rPr lang="en-SG" smtClean="0"/>
-              <a:t>22/3/2022</a:t>
+              <a:t>23/3/2022</a:t>
             </a:fld>
             <a:endParaRPr lang="en-SG"/>
           </a:p>
@@ -1975,7 +1977,7 @@
           <a:p>
             <a:fld id="{756B03D5-F1B6-433B-AEBF-A0D421B4E27D}" type="datetimeFigureOut">
               <a:rPr lang="en-SG" smtClean="0"/>
-              <a:t>22/3/2022</a:t>
+              <a:t>23/3/2022</a:t>
             </a:fld>
             <a:endParaRPr lang="en-SG"/>
           </a:p>
@@ -2088,7 +2090,7 @@
           <a:p>
             <a:fld id="{756B03D5-F1B6-433B-AEBF-A0D421B4E27D}" type="datetimeFigureOut">
               <a:rPr lang="en-SG" smtClean="0"/>
-              <a:t>22/3/2022</a:t>
+              <a:t>23/3/2022</a:t>
             </a:fld>
             <a:endParaRPr lang="en-SG"/>
           </a:p>
@@ -2401,7 +2403,7 @@
           <a:p>
             <a:fld id="{756B03D5-F1B6-433B-AEBF-A0D421B4E27D}" type="datetimeFigureOut">
               <a:rPr lang="en-SG" smtClean="0"/>
-              <a:t>22/3/2022</a:t>
+              <a:t>23/3/2022</a:t>
             </a:fld>
             <a:endParaRPr lang="en-SG"/>
           </a:p>
@@ -2690,7 +2692,7 @@
           <a:p>
             <a:fld id="{756B03D5-F1B6-433B-AEBF-A0D421B4E27D}" type="datetimeFigureOut">
               <a:rPr lang="en-SG" smtClean="0"/>
-              <a:t>22/3/2022</a:t>
+              <a:t>23/3/2022</a:t>
             </a:fld>
             <a:endParaRPr lang="en-SG"/>
           </a:p>
@@ -2933,7 +2935,7 @@
           <a:p>
             <a:fld id="{756B03D5-F1B6-433B-AEBF-A0D421B4E27D}" type="datetimeFigureOut">
               <a:rPr lang="en-SG" smtClean="0"/>
-              <a:t>22/3/2022</a:t>
+              <a:t>23/3/2022</a:t>
             </a:fld>
             <a:endParaRPr lang="en-SG"/>
           </a:p>
@@ -6706,7 +6708,7 @@
           <p:nvPr>
             <p:extLst>
               <p:ext uri="{D42A27DB-BD31-4B8C-83A1-F6EECF244321}">
-                <p14:modId xmlns:p14="http://schemas.microsoft.com/office/powerpoint/2010/main" val="3983659604"/>
+                <p14:modId xmlns:p14="http://schemas.microsoft.com/office/powerpoint/2010/main" val="1944921990"/>
               </p:ext>
             </p:extLst>
           </p:nvPr>
@@ -7598,6 +7600,2151 @@
     <p:extLst>
       <p:ext uri="{BB962C8B-B14F-4D97-AF65-F5344CB8AC3E}">
         <p14:creationId xmlns:p14="http://schemas.microsoft.com/office/powerpoint/2010/main" val="3687772355"/>
+      </p:ext>
+    </p:extLst>
+  </p:cSld>
+  <p:clrMapOvr>
+    <a:masterClrMapping/>
+  </p:clrMapOvr>
+</p:sld>
+</file>
+
+<file path=ppt/slides/slide5.xml><?xml version="1.0" encoding="utf-8"?>
+<p:sld xmlns:a="http://schemas.openxmlformats.org/drawingml/2006/main" xmlns:r="http://schemas.openxmlformats.org/officeDocument/2006/relationships" xmlns:p="http://schemas.openxmlformats.org/presentationml/2006/main">
+  <p:cSld>
+    <p:spTree>
+      <p:nvGrpSpPr>
+        <p:cNvPr id="1" name=""/>
+        <p:cNvGrpSpPr/>
+        <p:nvPr/>
+      </p:nvGrpSpPr>
+      <p:grpSpPr>
+        <a:xfrm>
+          <a:off x="0" y="0"/>
+          <a:ext cx="0" cy="0"/>
+          <a:chOff x="0" y="0"/>
+          <a:chExt cx="0" cy="0"/>
+        </a:xfrm>
+      </p:grpSpPr>
+      <p:sp>
+        <p:nvSpPr>
+          <p:cNvPr id="2" name="Title 1">
+            <a:extLst>
+              <a:ext uri="{FF2B5EF4-FFF2-40B4-BE49-F238E27FC236}">
+                <a16:creationId xmlns:a16="http://schemas.microsoft.com/office/drawing/2014/main" id="{C06FFA2E-E2F8-4218-B180-D1806391D3AC}"/>
+              </a:ext>
+            </a:extLst>
+          </p:cNvPr>
+          <p:cNvSpPr>
+            <a:spLocks noGrp="1"/>
+          </p:cNvSpPr>
+          <p:nvPr>
+            <p:ph type="title"/>
+          </p:nvPr>
+        </p:nvSpPr>
+        <p:spPr>
+          <a:xfrm>
+            <a:off x="838200" y="365126"/>
+            <a:ext cx="3188855" cy="669348"/>
+          </a:xfrm>
+        </p:spPr>
+        <p:txBody>
+          <a:bodyPr>
+            <a:normAutofit/>
+          </a:bodyPr>
+          <a:lstStyle/>
+          <a:p>
+            <a:r>
+              <a:rPr lang="en-SG" sz="2800" dirty="0">
+                <a:latin typeface="+mn-lt"/>
+              </a:rPr>
+              <a:t>Command Diagram</a:t>
+            </a:r>
+          </a:p>
+        </p:txBody>
+      </p:sp>
+      <p:sp>
+        <p:nvSpPr>
+          <p:cNvPr id="5" name="Rectangle 4">
+            <a:extLst>
+              <a:ext uri="{FF2B5EF4-FFF2-40B4-BE49-F238E27FC236}">
+                <a16:creationId xmlns:a16="http://schemas.microsoft.com/office/drawing/2014/main" id="{A100F4F7-EEBE-4F8D-BF2C-524DE3837457}"/>
+              </a:ext>
+            </a:extLst>
+          </p:cNvPr>
+          <p:cNvSpPr/>
+          <p:nvPr/>
+        </p:nvSpPr>
+        <p:spPr>
+          <a:xfrm>
+            <a:off x="5027663" y="1463964"/>
+            <a:ext cx="1767215" cy="572655"/>
+          </a:xfrm>
+          <a:prstGeom prst="rect">
+            <a:avLst/>
+          </a:prstGeom>
+          <a:solidFill>
+            <a:srgbClr val="FF5050"/>
+          </a:solidFill>
+          <a:ln>
+            <a:solidFill>
+              <a:srgbClr val="FF5050"/>
+            </a:solidFill>
+          </a:ln>
+        </p:spPr>
+        <p:style>
+          <a:lnRef idx="2">
+            <a:schemeClr val="accent1">
+              <a:shade val="50000"/>
+            </a:schemeClr>
+          </a:lnRef>
+          <a:fillRef idx="1">
+            <a:schemeClr val="accent1"/>
+          </a:fillRef>
+          <a:effectRef idx="0">
+            <a:schemeClr val="accent1"/>
+          </a:effectRef>
+          <a:fontRef idx="minor">
+            <a:schemeClr val="lt1"/>
+          </a:fontRef>
+        </p:style>
+        <p:txBody>
+          <a:bodyPr rtlCol="0" anchor="ctr"/>
+          <a:lstStyle/>
+          <a:p>
+            <a:pPr algn="ctr"/>
+            <a:r>
+              <a:rPr lang="en-SG" sz="1600" b="1" dirty="0">
+                <a:solidFill>
+                  <a:schemeClr val="tx1"/>
+                </a:solidFill>
+              </a:rPr>
+              <a:t>{abstract}</a:t>
+            </a:r>
+          </a:p>
+          <a:p>
+            <a:pPr algn="ctr"/>
+            <a:r>
+              <a:rPr lang="en-SG" sz="1600" b="1" dirty="0">
+                <a:solidFill>
+                  <a:schemeClr val="tx1"/>
+                </a:solidFill>
+              </a:rPr>
+              <a:t>Command</a:t>
+            </a:r>
+          </a:p>
+        </p:txBody>
+      </p:sp>
+      <p:sp>
+        <p:nvSpPr>
+          <p:cNvPr id="7" name="Rectangle 6">
+            <a:extLst>
+              <a:ext uri="{FF2B5EF4-FFF2-40B4-BE49-F238E27FC236}">
+                <a16:creationId xmlns:a16="http://schemas.microsoft.com/office/drawing/2014/main" id="{447820BC-FCA6-46F4-84D4-AEE2ABE6A9E1}"/>
+              </a:ext>
+            </a:extLst>
+          </p:cNvPr>
+          <p:cNvSpPr/>
+          <p:nvPr/>
+        </p:nvSpPr>
+        <p:spPr>
+          <a:xfrm>
+            <a:off x="1414711" y="3680690"/>
+            <a:ext cx="1485505" cy="401783"/>
+          </a:xfrm>
+          <a:prstGeom prst="rect">
+            <a:avLst/>
+          </a:prstGeom>
+          <a:solidFill>
+            <a:srgbClr val="FF5050"/>
+          </a:solidFill>
+          <a:ln>
+            <a:solidFill>
+              <a:srgbClr val="FF5050"/>
+            </a:solidFill>
+          </a:ln>
+        </p:spPr>
+        <p:style>
+          <a:lnRef idx="2">
+            <a:schemeClr val="accent1">
+              <a:shade val="50000"/>
+            </a:schemeClr>
+          </a:lnRef>
+          <a:fillRef idx="1">
+            <a:schemeClr val="accent1"/>
+          </a:fillRef>
+          <a:effectRef idx="0">
+            <a:schemeClr val="accent1"/>
+          </a:effectRef>
+          <a:fontRef idx="minor">
+            <a:schemeClr val="lt1"/>
+          </a:fontRef>
+        </p:style>
+        <p:txBody>
+          <a:bodyPr rtlCol="0" anchor="ctr"/>
+          <a:lstStyle/>
+          <a:p>
+            <a:pPr algn="ctr"/>
+            <a:r>
+              <a:rPr lang="en-SG" sz="1600" b="1" dirty="0" err="1">
+                <a:solidFill>
+                  <a:schemeClr val="tx1"/>
+                </a:solidFill>
+              </a:rPr>
+              <a:t>AddCommand</a:t>
+            </a:r>
+            <a:endParaRPr lang="en-SG" sz="1600" b="1" dirty="0">
+              <a:solidFill>
+                <a:schemeClr val="tx1"/>
+              </a:solidFill>
+            </a:endParaRPr>
+          </a:p>
+        </p:txBody>
+      </p:sp>
+      <p:sp>
+        <p:nvSpPr>
+          <p:cNvPr id="8" name="Rectangle 7">
+            <a:extLst>
+              <a:ext uri="{FF2B5EF4-FFF2-40B4-BE49-F238E27FC236}">
+                <a16:creationId xmlns:a16="http://schemas.microsoft.com/office/drawing/2014/main" id="{D33457F4-E676-4785-8999-37789A5A8B0C}"/>
+              </a:ext>
+            </a:extLst>
+          </p:cNvPr>
+          <p:cNvSpPr/>
+          <p:nvPr/>
+        </p:nvSpPr>
+        <p:spPr>
+          <a:xfrm>
+            <a:off x="3017220" y="3680686"/>
+            <a:ext cx="1413149" cy="401783"/>
+          </a:xfrm>
+          <a:prstGeom prst="rect">
+            <a:avLst/>
+          </a:prstGeom>
+          <a:solidFill>
+            <a:srgbClr val="FF5050"/>
+          </a:solidFill>
+          <a:ln>
+            <a:solidFill>
+              <a:srgbClr val="FF5050"/>
+            </a:solidFill>
+          </a:ln>
+        </p:spPr>
+        <p:style>
+          <a:lnRef idx="2">
+            <a:schemeClr val="accent1">
+              <a:shade val="50000"/>
+            </a:schemeClr>
+          </a:lnRef>
+          <a:fillRef idx="1">
+            <a:schemeClr val="accent1"/>
+          </a:fillRef>
+          <a:effectRef idx="0">
+            <a:schemeClr val="accent1"/>
+          </a:effectRef>
+          <a:fontRef idx="minor">
+            <a:schemeClr val="lt1"/>
+          </a:fontRef>
+        </p:style>
+        <p:txBody>
+          <a:bodyPr rtlCol="0" anchor="ctr"/>
+          <a:lstStyle/>
+          <a:p>
+            <a:pPr algn="ctr"/>
+            <a:r>
+              <a:rPr lang="en-SG" sz="1600" b="1" dirty="0" err="1">
+                <a:solidFill>
+                  <a:schemeClr val="tx1"/>
+                </a:solidFill>
+              </a:rPr>
+              <a:t>ByeCommand</a:t>
+            </a:r>
+            <a:endParaRPr lang="en-SG" sz="1600" b="1" dirty="0">
+              <a:solidFill>
+                <a:schemeClr val="tx1"/>
+              </a:solidFill>
+            </a:endParaRPr>
+          </a:p>
+        </p:txBody>
+      </p:sp>
+      <p:sp>
+        <p:nvSpPr>
+          <p:cNvPr id="9" name="Rectangle 8">
+            <a:extLst>
+              <a:ext uri="{FF2B5EF4-FFF2-40B4-BE49-F238E27FC236}">
+                <a16:creationId xmlns:a16="http://schemas.microsoft.com/office/drawing/2014/main" id="{FCB20380-C5B2-4E1F-8B46-F77A181AA6D1}"/>
+              </a:ext>
+            </a:extLst>
+          </p:cNvPr>
+          <p:cNvSpPr/>
+          <p:nvPr/>
+        </p:nvSpPr>
+        <p:spPr>
+          <a:xfrm>
+            <a:off x="4547373" y="3680686"/>
+            <a:ext cx="1693323" cy="401781"/>
+          </a:xfrm>
+          <a:prstGeom prst="rect">
+            <a:avLst/>
+          </a:prstGeom>
+          <a:solidFill>
+            <a:srgbClr val="FF5050"/>
+          </a:solidFill>
+          <a:ln>
+            <a:solidFill>
+              <a:srgbClr val="FF5050"/>
+            </a:solidFill>
+          </a:ln>
+        </p:spPr>
+        <p:style>
+          <a:lnRef idx="2">
+            <a:schemeClr val="accent1">
+              <a:shade val="50000"/>
+            </a:schemeClr>
+          </a:lnRef>
+          <a:fillRef idx="1">
+            <a:schemeClr val="accent1"/>
+          </a:fillRef>
+          <a:effectRef idx="0">
+            <a:schemeClr val="accent1"/>
+          </a:effectRef>
+          <a:fontRef idx="minor">
+            <a:schemeClr val="lt1"/>
+          </a:fontRef>
+        </p:style>
+        <p:txBody>
+          <a:bodyPr rtlCol="0" anchor="ctr"/>
+          <a:lstStyle/>
+          <a:p>
+            <a:pPr algn="ctr"/>
+            <a:r>
+              <a:rPr lang="en-SG" sz="1600" b="1" dirty="0" err="1">
+                <a:solidFill>
+                  <a:schemeClr val="tx1"/>
+                </a:solidFill>
+              </a:rPr>
+              <a:t>DeleteCommand</a:t>
+            </a:r>
+            <a:endParaRPr lang="en-SG" sz="1600" b="1" dirty="0">
+              <a:solidFill>
+                <a:schemeClr val="tx1"/>
+              </a:solidFill>
+            </a:endParaRPr>
+          </a:p>
+        </p:txBody>
+      </p:sp>
+      <p:sp>
+        <p:nvSpPr>
+          <p:cNvPr id="10" name="Rectangle 9">
+            <a:extLst>
+              <a:ext uri="{FF2B5EF4-FFF2-40B4-BE49-F238E27FC236}">
+                <a16:creationId xmlns:a16="http://schemas.microsoft.com/office/drawing/2014/main" id="{38D6B89D-3EAB-4DBC-B260-5045783DC1CC}"/>
+              </a:ext>
+            </a:extLst>
+          </p:cNvPr>
+          <p:cNvSpPr/>
+          <p:nvPr/>
+        </p:nvSpPr>
+        <p:spPr>
+          <a:xfrm>
+            <a:off x="8024864" y="3680686"/>
+            <a:ext cx="1345440" cy="401780"/>
+          </a:xfrm>
+          <a:prstGeom prst="rect">
+            <a:avLst/>
+          </a:prstGeom>
+          <a:solidFill>
+            <a:srgbClr val="FF5050"/>
+          </a:solidFill>
+          <a:ln>
+            <a:solidFill>
+              <a:srgbClr val="FF5050"/>
+            </a:solidFill>
+          </a:ln>
+        </p:spPr>
+        <p:style>
+          <a:lnRef idx="2">
+            <a:schemeClr val="accent1">
+              <a:shade val="50000"/>
+            </a:schemeClr>
+          </a:lnRef>
+          <a:fillRef idx="1">
+            <a:schemeClr val="accent1"/>
+          </a:fillRef>
+          <a:effectRef idx="0">
+            <a:schemeClr val="accent1"/>
+          </a:effectRef>
+          <a:fontRef idx="minor">
+            <a:schemeClr val="lt1"/>
+          </a:fontRef>
+        </p:style>
+        <p:txBody>
+          <a:bodyPr rtlCol="0" anchor="ctr"/>
+          <a:lstStyle/>
+          <a:p>
+            <a:pPr algn="ctr"/>
+            <a:r>
+              <a:rPr lang="en-SG" sz="1600" b="1" dirty="0" err="1">
+                <a:solidFill>
+                  <a:schemeClr val="tx1"/>
+                </a:solidFill>
+              </a:rPr>
+              <a:t>ListCommand</a:t>
+            </a:r>
+            <a:endParaRPr lang="en-SG" sz="1600" b="1" dirty="0">
+              <a:solidFill>
+                <a:schemeClr val="tx1"/>
+              </a:solidFill>
+            </a:endParaRPr>
+          </a:p>
+        </p:txBody>
+      </p:sp>
+      <p:sp>
+        <p:nvSpPr>
+          <p:cNvPr id="11" name="Rectangle 10">
+            <a:extLst>
+              <a:ext uri="{FF2B5EF4-FFF2-40B4-BE49-F238E27FC236}">
+                <a16:creationId xmlns:a16="http://schemas.microsoft.com/office/drawing/2014/main" id="{D9ACBEA3-843C-4495-922E-D28232A1997C}"/>
+              </a:ext>
+            </a:extLst>
+          </p:cNvPr>
+          <p:cNvSpPr/>
+          <p:nvPr/>
+        </p:nvSpPr>
+        <p:spPr>
+          <a:xfrm>
+            <a:off x="6357700" y="3680686"/>
+            <a:ext cx="1550160" cy="401780"/>
+          </a:xfrm>
+          <a:prstGeom prst="rect">
+            <a:avLst/>
+          </a:prstGeom>
+          <a:solidFill>
+            <a:srgbClr val="FF5050"/>
+          </a:solidFill>
+          <a:ln>
+            <a:solidFill>
+              <a:srgbClr val="FF5050"/>
+            </a:solidFill>
+          </a:ln>
+        </p:spPr>
+        <p:style>
+          <a:lnRef idx="2">
+            <a:schemeClr val="accent1">
+              <a:shade val="50000"/>
+            </a:schemeClr>
+          </a:lnRef>
+          <a:fillRef idx="1">
+            <a:schemeClr val="accent1"/>
+          </a:fillRef>
+          <a:effectRef idx="0">
+            <a:schemeClr val="accent1"/>
+          </a:effectRef>
+          <a:fontRef idx="minor">
+            <a:schemeClr val="lt1"/>
+          </a:fontRef>
+        </p:style>
+        <p:txBody>
+          <a:bodyPr rtlCol="0" anchor="ctr"/>
+          <a:lstStyle/>
+          <a:p>
+            <a:pPr algn="ctr"/>
+            <a:r>
+              <a:rPr lang="en-SG" sz="1600" b="1" dirty="0" err="1">
+                <a:solidFill>
+                  <a:schemeClr val="tx1"/>
+                </a:solidFill>
+              </a:rPr>
+              <a:t>HelpCommand</a:t>
+            </a:r>
+            <a:endParaRPr lang="en-SG" sz="1600" b="1" dirty="0">
+              <a:solidFill>
+                <a:schemeClr val="tx1"/>
+              </a:solidFill>
+            </a:endParaRPr>
+          </a:p>
+        </p:txBody>
+      </p:sp>
+      <p:sp>
+        <p:nvSpPr>
+          <p:cNvPr id="12" name="Rectangle 11">
+            <a:extLst>
+              <a:ext uri="{FF2B5EF4-FFF2-40B4-BE49-F238E27FC236}">
+                <a16:creationId xmlns:a16="http://schemas.microsoft.com/office/drawing/2014/main" id="{1D4CA466-1CE1-4861-AF18-C7345805012C}"/>
+              </a:ext>
+            </a:extLst>
+          </p:cNvPr>
+          <p:cNvSpPr/>
+          <p:nvPr/>
+        </p:nvSpPr>
+        <p:spPr>
+          <a:xfrm>
+            <a:off x="9487308" y="3680686"/>
+            <a:ext cx="1693323" cy="401780"/>
+          </a:xfrm>
+          <a:prstGeom prst="rect">
+            <a:avLst/>
+          </a:prstGeom>
+          <a:solidFill>
+            <a:srgbClr val="FF5050"/>
+          </a:solidFill>
+          <a:ln>
+            <a:solidFill>
+              <a:srgbClr val="FF5050"/>
+            </a:solidFill>
+          </a:ln>
+        </p:spPr>
+        <p:style>
+          <a:lnRef idx="2">
+            <a:schemeClr val="accent1">
+              <a:shade val="50000"/>
+            </a:schemeClr>
+          </a:lnRef>
+          <a:fillRef idx="1">
+            <a:schemeClr val="accent1"/>
+          </a:fillRef>
+          <a:effectRef idx="0">
+            <a:schemeClr val="accent1"/>
+          </a:effectRef>
+          <a:fontRef idx="minor">
+            <a:schemeClr val="lt1"/>
+          </a:fontRef>
+        </p:style>
+        <p:txBody>
+          <a:bodyPr rtlCol="0" anchor="ctr"/>
+          <a:lstStyle/>
+          <a:p>
+            <a:pPr algn="ctr"/>
+            <a:r>
+              <a:rPr lang="en-SG" sz="1600" b="1" dirty="0" err="1">
+                <a:solidFill>
+                  <a:schemeClr val="tx1"/>
+                </a:solidFill>
+              </a:rPr>
+              <a:t>UpdateCommand</a:t>
+            </a:r>
+            <a:endParaRPr lang="en-SG" sz="1600" b="1" dirty="0">
+              <a:solidFill>
+                <a:schemeClr val="tx1"/>
+              </a:solidFill>
+            </a:endParaRPr>
+          </a:p>
+        </p:txBody>
+      </p:sp>
+      <p:sp>
+        <p:nvSpPr>
+          <p:cNvPr id="13" name="Isosceles Triangle 12">
+            <a:extLst>
+              <a:ext uri="{FF2B5EF4-FFF2-40B4-BE49-F238E27FC236}">
+                <a16:creationId xmlns:a16="http://schemas.microsoft.com/office/drawing/2014/main" id="{442A135E-C893-49C3-BC59-F789E3D93A9B}"/>
+              </a:ext>
+            </a:extLst>
+          </p:cNvPr>
+          <p:cNvSpPr/>
+          <p:nvPr/>
+        </p:nvSpPr>
+        <p:spPr>
+          <a:xfrm>
+            <a:off x="5791198" y="2152073"/>
+            <a:ext cx="240146" cy="221672"/>
+          </a:xfrm>
+          <a:prstGeom prst="triangle">
+            <a:avLst/>
+          </a:prstGeom>
+          <a:ln w="28575"/>
+        </p:spPr>
+        <p:style>
+          <a:lnRef idx="2">
+            <a:schemeClr val="dk1"/>
+          </a:lnRef>
+          <a:fillRef idx="1">
+            <a:schemeClr val="lt1"/>
+          </a:fillRef>
+          <a:effectRef idx="0">
+            <a:schemeClr val="dk1"/>
+          </a:effectRef>
+          <a:fontRef idx="minor">
+            <a:schemeClr val="dk1"/>
+          </a:fontRef>
+        </p:style>
+        <p:txBody>
+          <a:bodyPr rtlCol="0" anchor="ctr"/>
+          <a:lstStyle/>
+          <a:p>
+            <a:pPr algn="ctr"/>
+            <a:endParaRPr lang="en-SG"/>
+          </a:p>
+        </p:txBody>
+      </p:sp>
+      <p:cxnSp>
+        <p:nvCxnSpPr>
+          <p:cNvPr id="20" name="Connector: Elbow 19">
+            <a:extLst>
+              <a:ext uri="{FF2B5EF4-FFF2-40B4-BE49-F238E27FC236}">
+                <a16:creationId xmlns:a16="http://schemas.microsoft.com/office/drawing/2014/main" id="{5CE868D7-554C-4847-9EAA-870B53D90F09}"/>
+              </a:ext>
+            </a:extLst>
+          </p:cNvPr>
+          <p:cNvCxnSpPr>
+            <a:stCxn id="13" idx="3"/>
+            <a:endCxn id="12" idx="0"/>
+          </p:cNvCxnSpPr>
+          <p:nvPr/>
+        </p:nvCxnSpPr>
+        <p:spPr>
+          <a:xfrm rot="16200000" flipH="1">
+            <a:off x="7469150" y="815865"/>
+            <a:ext cx="1306941" cy="4422699"/>
+          </a:xfrm>
+          <a:prstGeom prst="bentConnector3">
+            <a:avLst/>
+          </a:prstGeom>
+          <a:ln w="28575"/>
+        </p:spPr>
+        <p:style>
+          <a:lnRef idx="1">
+            <a:schemeClr val="dk1"/>
+          </a:lnRef>
+          <a:fillRef idx="0">
+            <a:schemeClr val="dk1"/>
+          </a:fillRef>
+          <a:effectRef idx="0">
+            <a:schemeClr val="dk1"/>
+          </a:effectRef>
+          <a:fontRef idx="minor">
+            <a:schemeClr val="tx1"/>
+          </a:fontRef>
+        </p:style>
+      </p:cxnSp>
+      <p:cxnSp>
+        <p:nvCxnSpPr>
+          <p:cNvPr id="24" name="Connector: Elbow 23">
+            <a:extLst>
+              <a:ext uri="{FF2B5EF4-FFF2-40B4-BE49-F238E27FC236}">
+                <a16:creationId xmlns:a16="http://schemas.microsoft.com/office/drawing/2014/main" id="{026B775D-4A6F-4243-B747-B7947C953E79}"/>
+              </a:ext>
+            </a:extLst>
+          </p:cNvPr>
+          <p:cNvCxnSpPr>
+            <a:stCxn id="10" idx="0"/>
+            <a:endCxn id="13" idx="3"/>
+          </p:cNvCxnSpPr>
+          <p:nvPr/>
+        </p:nvCxnSpPr>
+        <p:spPr>
+          <a:xfrm rot="16200000" flipV="1">
+            <a:off x="6650958" y="1634059"/>
+            <a:ext cx="1306941" cy="2786313"/>
+          </a:xfrm>
+          <a:prstGeom prst="bentConnector3">
+            <a:avLst/>
+          </a:prstGeom>
+          <a:ln w="28575"/>
+        </p:spPr>
+        <p:style>
+          <a:lnRef idx="1">
+            <a:schemeClr val="dk1"/>
+          </a:lnRef>
+          <a:fillRef idx="0">
+            <a:schemeClr val="dk1"/>
+          </a:fillRef>
+          <a:effectRef idx="0">
+            <a:schemeClr val="dk1"/>
+          </a:effectRef>
+          <a:fontRef idx="minor">
+            <a:schemeClr val="tx1"/>
+          </a:fontRef>
+        </p:style>
+      </p:cxnSp>
+      <p:cxnSp>
+        <p:nvCxnSpPr>
+          <p:cNvPr id="26" name="Connector: Elbow 25">
+            <a:extLst>
+              <a:ext uri="{FF2B5EF4-FFF2-40B4-BE49-F238E27FC236}">
+                <a16:creationId xmlns:a16="http://schemas.microsoft.com/office/drawing/2014/main" id="{0D73DDCB-5DF6-462B-95D6-9BDFF3D20BD7}"/>
+              </a:ext>
+            </a:extLst>
+          </p:cNvPr>
+          <p:cNvCxnSpPr>
+            <a:stCxn id="11" idx="0"/>
+            <a:endCxn id="13" idx="3"/>
+          </p:cNvCxnSpPr>
+          <p:nvPr/>
+        </p:nvCxnSpPr>
+        <p:spPr>
+          <a:xfrm rot="16200000" flipV="1">
+            <a:off x="5868556" y="2416461"/>
+            <a:ext cx="1306941" cy="1221509"/>
+          </a:xfrm>
+          <a:prstGeom prst="bentConnector3">
+            <a:avLst/>
+          </a:prstGeom>
+          <a:ln w="28575"/>
+        </p:spPr>
+        <p:style>
+          <a:lnRef idx="1">
+            <a:schemeClr val="dk1"/>
+          </a:lnRef>
+          <a:fillRef idx="0">
+            <a:schemeClr val="dk1"/>
+          </a:fillRef>
+          <a:effectRef idx="0">
+            <a:schemeClr val="dk1"/>
+          </a:effectRef>
+          <a:fontRef idx="minor">
+            <a:schemeClr val="tx1"/>
+          </a:fontRef>
+        </p:style>
+      </p:cxnSp>
+      <p:cxnSp>
+        <p:nvCxnSpPr>
+          <p:cNvPr id="28" name="Connector: Elbow 27">
+            <a:extLst>
+              <a:ext uri="{FF2B5EF4-FFF2-40B4-BE49-F238E27FC236}">
+                <a16:creationId xmlns:a16="http://schemas.microsoft.com/office/drawing/2014/main" id="{F526BD72-992F-45C0-951C-09AA50A3B36A}"/>
+              </a:ext>
+            </a:extLst>
+          </p:cNvPr>
+          <p:cNvCxnSpPr>
+            <a:stCxn id="9" idx="0"/>
+            <a:endCxn id="13" idx="3"/>
+          </p:cNvCxnSpPr>
+          <p:nvPr/>
+        </p:nvCxnSpPr>
+        <p:spPr>
+          <a:xfrm rot="5400000" flipH="1" flipV="1">
+            <a:off x="4999183" y="2768598"/>
+            <a:ext cx="1306941" cy="517236"/>
+          </a:xfrm>
+          <a:prstGeom prst="bentConnector3">
+            <a:avLst/>
+          </a:prstGeom>
+          <a:ln w="28575"/>
+        </p:spPr>
+        <p:style>
+          <a:lnRef idx="1">
+            <a:schemeClr val="dk1"/>
+          </a:lnRef>
+          <a:fillRef idx="0">
+            <a:schemeClr val="dk1"/>
+          </a:fillRef>
+          <a:effectRef idx="0">
+            <a:schemeClr val="dk1"/>
+          </a:effectRef>
+          <a:fontRef idx="minor">
+            <a:schemeClr val="tx1"/>
+          </a:fontRef>
+        </p:style>
+      </p:cxnSp>
+      <p:cxnSp>
+        <p:nvCxnSpPr>
+          <p:cNvPr id="30" name="Connector: Elbow 29">
+            <a:extLst>
+              <a:ext uri="{FF2B5EF4-FFF2-40B4-BE49-F238E27FC236}">
+                <a16:creationId xmlns:a16="http://schemas.microsoft.com/office/drawing/2014/main" id="{626F75A2-B130-464C-BFD4-559869410A02}"/>
+              </a:ext>
+            </a:extLst>
+          </p:cNvPr>
+          <p:cNvCxnSpPr>
+            <a:stCxn id="7" idx="0"/>
+            <a:endCxn id="13" idx="3"/>
+          </p:cNvCxnSpPr>
+          <p:nvPr/>
+        </p:nvCxnSpPr>
+        <p:spPr>
+          <a:xfrm rot="5400000" flipH="1" flipV="1">
+            <a:off x="3380895" y="1150315"/>
+            <a:ext cx="1306945" cy="3753807"/>
+          </a:xfrm>
+          <a:prstGeom prst="bentConnector3">
+            <a:avLst/>
+          </a:prstGeom>
+          <a:ln w="28575"/>
+        </p:spPr>
+        <p:style>
+          <a:lnRef idx="1">
+            <a:schemeClr val="dk1"/>
+          </a:lnRef>
+          <a:fillRef idx="0">
+            <a:schemeClr val="dk1"/>
+          </a:fillRef>
+          <a:effectRef idx="0">
+            <a:schemeClr val="dk1"/>
+          </a:effectRef>
+          <a:fontRef idx="minor">
+            <a:schemeClr val="tx1"/>
+          </a:fontRef>
+        </p:style>
+      </p:cxnSp>
+      <p:cxnSp>
+        <p:nvCxnSpPr>
+          <p:cNvPr id="34" name="Connector: Elbow 33">
+            <a:extLst>
+              <a:ext uri="{FF2B5EF4-FFF2-40B4-BE49-F238E27FC236}">
+                <a16:creationId xmlns:a16="http://schemas.microsoft.com/office/drawing/2014/main" id="{7240C5DB-04D6-49AA-A569-9576789B012B}"/>
+              </a:ext>
+            </a:extLst>
+          </p:cNvPr>
+          <p:cNvCxnSpPr>
+            <a:stCxn id="8" idx="0"/>
+            <a:endCxn id="13" idx="3"/>
+          </p:cNvCxnSpPr>
+          <p:nvPr/>
+        </p:nvCxnSpPr>
+        <p:spPr>
+          <a:xfrm rot="5400000" flipH="1" flipV="1">
+            <a:off x="4164063" y="1933478"/>
+            <a:ext cx="1306941" cy="2187476"/>
+          </a:xfrm>
+          <a:prstGeom prst="bentConnector3">
+            <a:avLst/>
+          </a:prstGeom>
+          <a:ln w="28575"/>
+        </p:spPr>
+        <p:style>
+          <a:lnRef idx="1">
+            <a:schemeClr val="dk1"/>
+          </a:lnRef>
+          <a:fillRef idx="0">
+            <a:schemeClr val="dk1"/>
+          </a:fillRef>
+          <a:effectRef idx="0">
+            <a:schemeClr val="dk1"/>
+          </a:effectRef>
+          <a:fontRef idx="minor">
+            <a:schemeClr val="tx1"/>
+          </a:fontRef>
+        </p:style>
+      </p:cxnSp>
+      <p:sp>
+        <p:nvSpPr>
+          <p:cNvPr id="36" name="Rectangle 35">
+            <a:extLst>
+              <a:ext uri="{FF2B5EF4-FFF2-40B4-BE49-F238E27FC236}">
+                <a16:creationId xmlns:a16="http://schemas.microsoft.com/office/drawing/2014/main" id="{2B74825A-F55A-4FC8-890F-E358D5EF3A1C}"/>
+              </a:ext>
+            </a:extLst>
+          </p:cNvPr>
+          <p:cNvSpPr/>
+          <p:nvPr/>
+        </p:nvSpPr>
+        <p:spPr>
+          <a:xfrm>
+            <a:off x="5117983" y="6026517"/>
+            <a:ext cx="1346430" cy="507127"/>
+          </a:xfrm>
+          <a:prstGeom prst="rect">
+            <a:avLst/>
+          </a:prstGeom>
+          <a:solidFill>
+            <a:srgbClr val="00B0F0"/>
+          </a:solidFill>
+          <a:ln>
+            <a:solidFill>
+              <a:srgbClr val="00B0F0"/>
+            </a:solidFill>
+          </a:ln>
+        </p:spPr>
+        <p:style>
+          <a:lnRef idx="2">
+            <a:schemeClr val="accent1">
+              <a:shade val="50000"/>
+            </a:schemeClr>
+          </a:lnRef>
+          <a:fillRef idx="1">
+            <a:schemeClr val="accent1"/>
+          </a:fillRef>
+          <a:effectRef idx="0">
+            <a:schemeClr val="accent1"/>
+          </a:effectRef>
+          <a:fontRef idx="minor">
+            <a:schemeClr val="lt1"/>
+          </a:fontRef>
+        </p:style>
+        <p:txBody>
+          <a:bodyPr rtlCol="0" anchor="ctr"/>
+          <a:lstStyle/>
+          <a:p>
+            <a:pPr algn="ctr"/>
+            <a:r>
+              <a:rPr lang="en-SG" sz="1600" b="1" dirty="0">
+                <a:solidFill>
+                  <a:schemeClr val="tx1"/>
+                </a:solidFill>
+              </a:rPr>
+              <a:t>Parser</a:t>
+            </a:r>
+          </a:p>
+        </p:txBody>
+      </p:sp>
+      <p:cxnSp>
+        <p:nvCxnSpPr>
+          <p:cNvPr id="41" name="Straight Arrow Connector 40">
+            <a:extLst>
+              <a:ext uri="{FF2B5EF4-FFF2-40B4-BE49-F238E27FC236}">
+                <a16:creationId xmlns:a16="http://schemas.microsoft.com/office/drawing/2014/main" id="{A2B86465-3842-46DD-943F-EA9799EBAC9A}"/>
+              </a:ext>
+            </a:extLst>
+          </p:cNvPr>
+          <p:cNvCxnSpPr>
+            <a:cxnSpLocks/>
+            <a:endCxn id="12" idx="2"/>
+          </p:cNvCxnSpPr>
+          <p:nvPr/>
+        </p:nvCxnSpPr>
+        <p:spPr>
+          <a:xfrm flipV="1">
+            <a:off x="5791198" y="4082466"/>
+            <a:ext cx="4542772" cy="1431643"/>
+          </a:xfrm>
+          <a:prstGeom prst="straightConnector1">
+            <a:avLst/>
+          </a:prstGeom>
+          <a:ln w="28575" cap="flat" cmpd="sng" algn="ctr">
+            <a:solidFill>
+              <a:schemeClr val="dk1"/>
+            </a:solidFill>
+            <a:prstDash val="dash"/>
+            <a:round/>
+            <a:headEnd type="none" w="med" len="med"/>
+            <a:tailEnd type="arrow" w="med" len="med"/>
+          </a:ln>
+        </p:spPr>
+        <p:style>
+          <a:lnRef idx="0">
+            <a:scrgbClr r="0" g="0" b="0"/>
+          </a:lnRef>
+          <a:fillRef idx="0">
+            <a:scrgbClr r="0" g="0" b="0"/>
+          </a:fillRef>
+          <a:effectRef idx="0">
+            <a:scrgbClr r="0" g="0" b="0"/>
+          </a:effectRef>
+          <a:fontRef idx="minor">
+            <a:schemeClr val="tx1"/>
+          </a:fontRef>
+        </p:style>
+      </p:cxnSp>
+      <p:cxnSp>
+        <p:nvCxnSpPr>
+          <p:cNvPr id="44" name="Straight Arrow Connector 43">
+            <a:extLst>
+              <a:ext uri="{FF2B5EF4-FFF2-40B4-BE49-F238E27FC236}">
+                <a16:creationId xmlns:a16="http://schemas.microsoft.com/office/drawing/2014/main" id="{EC3AD41F-F032-46F7-B4D5-DFAD36583B70}"/>
+              </a:ext>
+            </a:extLst>
+          </p:cNvPr>
+          <p:cNvCxnSpPr>
+            <a:cxnSpLocks/>
+            <a:endCxn id="10" idx="2"/>
+          </p:cNvCxnSpPr>
+          <p:nvPr/>
+        </p:nvCxnSpPr>
+        <p:spPr>
+          <a:xfrm flipV="1">
+            <a:off x="5791198" y="4082466"/>
+            <a:ext cx="2906386" cy="1431642"/>
+          </a:xfrm>
+          <a:prstGeom prst="straightConnector1">
+            <a:avLst/>
+          </a:prstGeom>
+          <a:ln w="28575" cap="flat" cmpd="sng" algn="ctr">
+            <a:solidFill>
+              <a:schemeClr val="dk1"/>
+            </a:solidFill>
+            <a:prstDash val="dash"/>
+            <a:round/>
+            <a:headEnd type="none" w="med" len="med"/>
+            <a:tailEnd type="arrow" w="med" len="med"/>
+          </a:ln>
+        </p:spPr>
+        <p:style>
+          <a:lnRef idx="0">
+            <a:scrgbClr r="0" g="0" b="0"/>
+          </a:lnRef>
+          <a:fillRef idx="0">
+            <a:scrgbClr r="0" g="0" b="0"/>
+          </a:fillRef>
+          <a:effectRef idx="0">
+            <a:scrgbClr r="0" g="0" b="0"/>
+          </a:effectRef>
+          <a:fontRef idx="minor">
+            <a:schemeClr val="tx1"/>
+          </a:fontRef>
+        </p:style>
+      </p:cxnSp>
+      <p:cxnSp>
+        <p:nvCxnSpPr>
+          <p:cNvPr id="46" name="Straight Arrow Connector 45">
+            <a:extLst>
+              <a:ext uri="{FF2B5EF4-FFF2-40B4-BE49-F238E27FC236}">
+                <a16:creationId xmlns:a16="http://schemas.microsoft.com/office/drawing/2014/main" id="{960051D8-CB35-4DEC-BEA8-213F661DEF31}"/>
+              </a:ext>
+            </a:extLst>
+          </p:cNvPr>
+          <p:cNvCxnSpPr>
+            <a:cxnSpLocks/>
+            <a:endCxn id="11" idx="2"/>
+          </p:cNvCxnSpPr>
+          <p:nvPr/>
+        </p:nvCxnSpPr>
+        <p:spPr>
+          <a:xfrm flipV="1">
+            <a:off x="5834301" y="4082466"/>
+            <a:ext cx="1298479" cy="1431642"/>
+          </a:xfrm>
+          <a:prstGeom prst="straightConnector1">
+            <a:avLst/>
+          </a:prstGeom>
+          <a:ln w="28575" cap="flat" cmpd="sng" algn="ctr">
+            <a:solidFill>
+              <a:schemeClr val="dk1"/>
+            </a:solidFill>
+            <a:prstDash val="dash"/>
+            <a:round/>
+            <a:headEnd type="none" w="med" len="med"/>
+            <a:tailEnd type="arrow" w="med" len="med"/>
+          </a:ln>
+        </p:spPr>
+        <p:style>
+          <a:lnRef idx="0">
+            <a:scrgbClr r="0" g="0" b="0"/>
+          </a:lnRef>
+          <a:fillRef idx="0">
+            <a:scrgbClr r="0" g="0" b="0"/>
+          </a:fillRef>
+          <a:effectRef idx="0">
+            <a:scrgbClr r="0" g="0" b="0"/>
+          </a:effectRef>
+          <a:fontRef idx="minor">
+            <a:schemeClr val="tx1"/>
+          </a:fontRef>
+        </p:style>
+      </p:cxnSp>
+      <p:cxnSp>
+        <p:nvCxnSpPr>
+          <p:cNvPr id="49" name="Straight Arrow Connector 48">
+            <a:extLst>
+              <a:ext uri="{FF2B5EF4-FFF2-40B4-BE49-F238E27FC236}">
+                <a16:creationId xmlns:a16="http://schemas.microsoft.com/office/drawing/2014/main" id="{34325D9E-36CD-40F2-89B7-1F8F2F5C3502}"/>
+              </a:ext>
+            </a:extLst>
+          </p:cNvPr>
+          <p:cNvCxnSpPr>
+            <a:cxnSpLocks/>
+            <a:endCxn id="9" idx="2"/>
+          </p:cNvCxnSpPr>
+          <p:nvPr/>
+        </p:nvCxnSpPr>
+        <p:spPr>
+          <a:xfrm flipH="1" flipV="1">
+            <a:off x="5394035" y="4082467"/>
+            <a:ext cx="397162" cy="1405593"/>
+          </a:xfrm>
+          <a:prstGeom prst="straightConnector1">
+            <a:avLst/>
+          </a:prstGeom>
+          <a:ln w="28575" cap="flat" cmpd="sng" algn="ctr">
+            <a:solidFill>
+              <a:schemeClr val="dk1"/>
+            </a:solidFill>
+            <a:prstDash val="dash"/>
+            <a:round/>
+            <a:headEnd type="none" w="med" len="med"/>
+            <a:tailEnd type="arrow" w="med" len="med"/>
+          </a:ln>
+        </p:spPr>
+        <p:style>
+          <a:lnRef idx="0">
+            <a:scrgbClr r="0" g="0" b="0"/>
+          </a:lnRef>
+          <a:fillRef idx="0">
+            <a:scrgbClr r="0" g="0" b="0"/>
+          </a:fillRef>
+          <a:effectRef idx="0">
+            <a:scrgbClr r="0" g="0" b="0"/>
+          </a:effectRef>
+          <a:fontRef idx="minor">
+            <a:schemeClr val="tx1"/>
+          </a:fontRef>
+        </p:style>
+      </p:cxnSp>
+      <p:cxnSp>
+        <p:nvCxnSpPr>
+          <p:cNvPr id="63" name="Straight Connector 62">
+            <a:extLst>
+              <a:ext uri="{FF2B5EF4-FFF2-40B4-BE49-F238E27FC236}">
+                <a16:creationId xmlns:a16="http://schemas.microsoft.com/office/drawing/2014/main" id="{CE4285D3-D42F-4BE7-A031-A469680AD4F7}"/>
+              </a:ext>
+            </a:extLst>
+          </p:cNvPr>
+          <p:cNvCxnSpPr>
+            <a:stCxn id="36" idx="0"/>
+          </p:cNvCxnSpPr>
+          <p:nvPr/>
+        </p:nvCxnSpPr>
+        <p:spPr>
+          <a:xfrm flipH="1" flipV="1">
+            <a:off x="5791197" y="5514108"/>
+            <a:ext cx="1" cy="512409"/>
+          </a:xfrm>
+          <a:prstGeom prst="line">
+            <a:avLst/>
+          </a:prstGeom>
+          <a:ln w="31750">
+            <a:solidFill>
+              <a:schemeClr val="tx1"/>
+            </a:solidFill>
+            <a:prstDash val="dash"/>
+          </a:ln>
+        </p:spPr>
+        <p:style>
+          <a:lnRef idx="1">
+            <a:schemeClr val="accent1"/>
+          </a:lnRef>
+          <a:fillRef idx="0">
+            <a:schemeClr val="accent1"/>
+          </a:fillRef>
+          <a:effectRef idx="0">
+            <a:schemeClr val="accent1"/>
+          </a:effectRef>
+          <a:fontRef idx="minor">
+            <a:schemeClr val="tx1"/>
+          </a:fontRef>
+        </p:style>
+      </p:cxnSp>
+      <p:cxnSp>
+        <p:nvCxnSpPr>
+          <p:cNvPr id="64" name="Straight Arrow Connector 63">
+            <a:extLst>
+              <a:ext uri="{FF2B5EF4-FFF2-40B4-BE49-F238E27FC236}">
+                <a16:creationId xmlns:a16="http://schemas.microsoft.com/office/drawing/2014/main" id="{9FF0C808-6821-4B83-9A9D-D02956473F07}"/>
+              </a:ext>
+            </a:extLst>
+          </p:cNvPr>
+          <p:cNvCxnSpPr>
+            <a:cxnSpLocks/>
+            <a:endCxn id="8" idx="2"/>
+          </p:cNvCxnSpPr>
+          <p:nvPr/>
+        </p:nvCxnSpPr>
+        <p:spPr>
+          <a:xfrm flipH="1" flipV="1">
+            <a:off x="3723795" y="4082469"/>
+            <a:ext cx="2067402" cy="1431639"/>
+          </a:xfrm>
+          <a:prstGeom prst="straightConnector1">
+            <a:avLst/>
+          </a:prstGeom>
+          <a:ln w="28575" cap="flat" cmpd="sng" algn="ctr">
+            <a:solidFill>
+              <a:schemeClr val="dk1"/>
+            </a:solidFill>
+            <a:prstDash val="dash"/>
+            <a:round/>
+            <a:headEnd type="none" w="med" len="med"/>
+            <a:tailEnd type="arrow" w="med" len="med"/>
+          </a:ln>
+        </p:spPr>
+        <p:style>
+          <a:lnRef idx="0">
+            <a:scrgbClr r="0" g="0" b="0"/>
+          </a:lnRef>
+          <a:fillRef idx="0">
+            <a:scrgbClr r="0" g="0" b="0"/>
+          </a:fillRef>
+          <a:effectRef idx="0">
+            <a:scrgbClr r="0" g="0" b="0"/>
+          </a:effectRef>
+          <a:fontRef idx="minor">
+            <a:schemeClr val="tx1"/>
+          </a:fontRef>
+        </p:style>
+      </p:cxnSp>
+      <p:cxnSp>
+        <p:nvCxnSpPr>
+          <p:cNvPr id="67" name="Straight Arrow Connector 66">
+            <a:extLst>
+              <a:ext uri="{FF2B5EF4-FFF2-40B4-BE49-F238E27FC236}">
+                <a16:creationId xmlns:a16="http://schemas.microsoft.com/office/drawing/2014/main" id="{E326F1C4-8448-479A-B7D5-8F0648033436}"/>
+              </a:ext>
+            </a:extLst>
+          </p:cNvPr>
+          <p:cNvCxnSpPr>
+            <a:cxnSpLocks/>
+            <a:endCxn id="7" idx="2"/>
+          </p:cNvCxnSpPr>
+          <p:nvPr/>
+        </p:nvCxnSpPr>
+        <p:spPr>
+          <a:xfrm flipH="1" flipV="1">
+            <a:off x="2157464" y="4082473"/>
+            <a:ext cx="3633733" cy="1431635"/>
+          </a:xfrm>
+          <a:prstGeom prst="straightConnector1">
+            <a:avLst/>
+          </a:prstGeom>
+          <a:ln w="28575" cap="flat" cmpd="sng" algn="ctr">
+            <a:solidFill>
+              <a:schemeClr val="dk1"/>
+            </a:solidFill>
+            <a:prstDash val="dash"/>
+            <a:round/>
+            <a:headEnd type="none" w="med" len="med"/>
+            <a:tailEnd type="arrow" w="med" len="med"/>
+          </a:ln>
+        </p:spPr>
+        <p:style>
+          <a:lnRef idx="0">
+            <a:scrgbClr r="0" g="0" b="0"/>
+          </a:lnRef>
+          <a:fillRef idx="0">
+            <a:scrgbClr r="0" g="0" b="0"/>
+          </a:fillRef>
+          <a:effectRef idx="0">
+            <a:scrgbClr r="0" g="0" b="0"/>
+          </a:effectRef>
+          <a:fontRef idx="minor">
+            <a:schemeClr val="tx1"/>
+          </a:fontRef>
+        </p:style>
+      </p:cxnSp>
+      <p:sp>
+        <p:nvSpPr>
+          <p:cNvPr id="71" name="TextBox 70">
+            <a:extLst>
+              <a:ext uri="{FF2B5EF4-FFF2-40B4-BE49-F238E27FC236}">
+                <a16:creationId xmlns:a16="http://schemas.microsoft.com/office/drawing/2014/main" id="{A8C36A28-A6C6-4E63-8420-4C1EBB303EF9}"/>
+              </a:ext>
+            </a:extLst>
+          </p:cNvPr>
+          <p:cNvSpPr txBox="1"/>
+          <p:nvPr/>
+        </p:nvSpPr>
+        <p:spPr>
+          <a:xfrm>
+            <a:off x="5749345" y="5661846"/>
+            <a:ext cx="1105659" cy="369332"/>
+          </a:xfrm>
+          <a:prstGeom prst="rect">
+            <a:avLst/>
+          </a:prstGeom>
+          <a:noFill/>
+        </p:spPr>
+        <p:txBody>
+          <a:bodyPr wrap="square" rtlCol="0">
+            <a:spAutoFit/>
+          </a:bodyPr>
+          <a:lstStyle/>
+          <a:p>
+            <a:r>
+              <a:rPr lang="en-SG" dirty="0"/>
+              <a:t>creates</a:t>
+            </a:r>
+          </a:p>
+        </p:txBody>
+      </p:sp>
+      <p:sp>
+        <p:nvSpPr>
+          <p:cNvPr id="72" name="Isosceles Triangle 71">
+            <a:extLst>
+              <a:ext uri="{FF2B5EF4-FFF2-40B4-BE49-F238E27FC236}">
+                <a16:creationId xmlns:a16="http://schemas.microsoft.com/office/drawing/2014/main" id="{65B70C28-DA76-4D4D-8D87-8943C0141C21}"/>
+              </a:ext>
+            </a:extLst>
+          </p:cNvPr>
+          <p:cNvSpPr/>
+          <p:nvPr/>
+        </p:nvSpPr>
+        <p:spPr>
+          <a:xfrm>
+            <a:off x="6106701" y="5628679"/>
+            <a:ext cx="132177" cy="102384"/>
+          </a:xfrm>
+          <a:prstGeom prst="triangle">
+            <a:avLst/>
+          </a:prstGeom>
+          <a:solidFill>
+            <a:schemeClr val="tx1"/>
+          </a:solidFill>
+          <a:ln>
+            <a:solidFill>
+              <a:schemeClr val="tx1"/>
+            </a:solidFill>
+          </a:ln>
+        </p:spPr>
+        <p:style>
+          <a:lnRef idx="2">
+            <a:schemeClr val="accent1">
+              <a:shade val="50000"/>
+            </a:schemeClr>
+          </a:lnRef>
+          <a:fillRef idx="1">
+            <a:schemeClr val="accent1"/>
+          </a:fillRef>
+          <a:effectRef idx="0">
+            <a:schemeClr val="accent1"/>
+          </a:effectRef>
+          <a:fontRef idx="minor">
+            <a:schemeClr val="lt1"/>
+          </a:fontRef>
+        </p:style>
+        <p:txBody>
+          <a:bodyPr rtlCol="0" anchor="ctr"/>
+          <a:lstStyle/>
+          <a:p>
+            <a:pPr algn="ctr"/>
+            <a:endParaRPr lang="en-SG"/>
+          </a:p>
+        </p:txBody>
+      </p:sp>
+      <p:sp>
+        <p:nvSpPr>
+          <p:cNvPr id="73" name="TextBox 72">
+            <a:extLst>
+              <a:ext uri="{FF2B5EF4-FFF2-40B4-BE49-F238E27FC236}">
+                <a16:creationId xmlns:a16="http://schemas.microsoft.com/office/drawing/2014/main" id="{E9FE5855-AD84-4A14-99A9-1A03313CBEE5}"/>
+              </a:ext>
+            </a:extLst>
+          </p:cNvPr>
+          <p:cNvSpPr txBox="1"/>
+          <p:nvPr/>
+        </p:nvSpPr>
+        <p:spPr>
+          <a:xfrm>
+            <a:off x="1810424" y="4154011"/>
+            <a:ext cx="553970" cy="369332"/>
+          </a:xfrm>
+          <a:prstGeom prst="rect">
+            <a:avLst/>
+          </a:prstGeom>
+          <a:noFill/>
+        </p:spPr>
+        <p:txBody>
+          <a:bodyPr wrap="square" rtlCol="0">
+            <a:spAutoFit/>
+          </a:bodyPr>
+          <a:lstStyle/>
+          <a:p>
+            <a:r>
+              <a:rPr lang="en-SG" dirty="0"/>
+              <a:t>0..1</a:t>
+            </a:r>
+          </a:p>
+        </p:txBody>
+      </p:sp>
+      <p:sp>
+        <p:nvSpPr>
+          <p:cNvPr id="74" name="TextBox 73">
+            <a:extLst>
+              <a:ext uri="{FF2B5EF4-FFF2-40B4-BE49-F238E27FC236}">
+                <a16:creationId xmlns:a16="http://schemas.microsoft.com/office/drawing/2014/main" id="{3643C6A5-B608-4C4C-B292-1C0493052C43}"/>
+              </a:ext>
+            </a:extLst>
+          </p:cNvPr>
+          <p:cNvSpPr txBox="1"/>
+          <p:nvPr/>
+        </p:nvSpPr>
+        <p:spPr>
+          <a:xfrm>
+            <a:off x="3412445" y="4162492"/>
+            <a:ext cx="553970" cy="369332"/>
+          </a:xfrm>
+          <a:prstGeom prst="rect">
+            <a:avLst/>
+          </a:prstGeom>
+          <a:noFill/>
+        </p:spPr>
+        <p:txBody>
+          <a:bodyPr wrap="square" rtlCol="0">
+            <a:spAutoFit/>
+          </a:bodyPr>
+          <a:lstStyle/>
+          <a:p>
+            <a:r>
+              <a:rPr lang="en-SG" dirty="0"/>
+              <a:t>0..1</a:t>
+            </a:r>
+          </a:p>
+        </p:txBody>
+      </p:sp>
+      <p:sp>
+        <p:nvSpPr>
+          <p:cNvPr id="75" name="TextBox 74">
+            <a:extLst>
+              <a:ext uri="{FF2B5EF4-FFF2-40B4-BE49-F238E27FC236}">
+                <a16:creationId xmlns:a16="http://schemas.microsoft.com/office/drawing/2014/main" id="{7026F092-B597-422E-AAF8-231C62B4BB6E}"/>
+              </a:ext>
+            </a:extLst>
+          </p:cNvPr>
+          <p:cNvSpPr txBox="1"/>
+          <p:nvPr/>
+        </p:nvSpPr>
+        <p:spPr>
+          <a:xfrm>
+            <a:off x="4918229" y="4154005"/>
+            <a:ext cx="553970" cy="369332"/>
+          </a:xfrm>
+          <a:prstGeom prst="rect">
+            <a:avLst/>
+          </a:prstGeom>
+          <a:noFill/>
+        </p:spPr>
+        <p:txBody>
+          <a:bodyPr wrap="square" rtlCol="0">
+            <a:spAutoFit/>
+          </a:bodyPr>
+          <a:lstStyle/>
+          <a:p>
+            <a:r>
+              <a:rPr lang="en-SG" dirty="0"/>
+              <a:t>0..1</a:t>
+            </a:r>
+          </a:p>
+        </p:txBody>
+      </p:sp>
+      <p:sp>
+        <p:nvSpPr>
+          <p:cNvPr id="76" name="TextBox 75">
+            <a:extLst>
+              <a:ext uri="{FF2B5EF4-FFF2-40B4-BE49-F238E27FC236}">
+                <a16:creationId xmlns:a16="http://schemas.microsoft.com/office/drawing/2014/main" id="{3C4B8B36-FC02-4562-8BED-C981078C429C}"/>
+              </a:ext>
+            </a:extLst>
+          </p:cNvPr>
+          <p:cNvSpPr txBox="1"/>
+          <p:nvPr/>
+        </p:nvSpPr>
+        <p:spPr>
+          <a:xfrm>
+            <a:off x="6245041" y="4162492"/>
+            <a:ext cx="553970" cy="369332"/>
+          </a:xfrm>
+          <a:prstGeom prst="rect">
+            <a:avLst/>
+          </a:prstGeom>
+          <a:noFill/>
+        </p:spPr>
+        <p:txBody>
+          <a:bodyPr wrap="square" rtlCol="0">
+            <a:spAutoFit/>
+          </a:bodyPr>
+          <a:lstStyle/>
+          <a:p>
+            <a:r>
+              <a:rPr lang="en-SG" dirty="0"/>
+              <a:t>0..1</a:t>
+            </a:r>
+          </a:p>
+        </p:txBody>
+      </p:sp>
+      <p:sp>
+        <p:nvSpPr>
+          <p:cNvPr id="77" name="TextBox 76">
+            <a:extLst>
+              <a:ext uri="{FF2B5EF4-FFF2-40B4-BE49-F238E27FC236}">
+                <a16:creationId xmlns:a16="http://schemas.microsoft.com/office/drawing/2014/main" id="{B9B4CE2A-4A48-468F-8E2B-DC098BBAE5B1}"/>
+              </a:ext>
+            </a:extLst>
+          </p:cNvPr>
+          <p:cNvSpPr txBox="1"/>
+          <p:nvPr/>
+        </p:nvSpPr>
+        <p:spPr>
+          <a:xfrm>
+            <a:off x="7488866" y="4167739"/>
+            <a:ext cx="553970" cy="369332"/>
+          </a:xfrm>
+          <a:prstGeom prst="rect">
+            <a:avLst/>
+          </a:prstGeom>
+          <a:noFill/>
+        </p:spPr>
+        <p:txBody>
+          <a:bodyPr wrap="square" rtlCol="0">
+            <a:spAutoFit/>
+          </a:bodyPr>
+          <a:lstStyle/>
+          <a:p>
+            <a:r>
+              <a:rPr lang="en-SG" dirty="0"/>
+              <a:t>0..1</a:t>
+            </a:r>
+          </a:p>
+        </p:txBody>
+      </p:sp>
+      <p:sp>
+        <p:nvSpPr>
+          <p:cNvPr id="78" name="TextBox 77">
+            <a:extLst>
+              <a:ext uri="{FF2B5EF4-FFF2-40B4-BE49-F238E27FC236}">
+                <a16:creationId xmlns:a16="http://schemas.microsoft.com/office/drawing/2014/main" id="{D49FC640-FEA9-489E-B2AF-B6178E24A51C}"/>
+              </a:ext>
+            </a:extLst>
+          </p:cNvPr>
+          <p:cNvSpPr txBox="1"/>
+          <p:nvPr/>
+        </p:nvSpPr>
+        <p:spPr>
+          <a:xfrm>
+            <a:off x="8744439" y="4154005"/>
+            <a:ext cx="553970" cy="369332"/>
+          </a:xfrm>
+          <a:prstGeom prst="rect">
+            <a:avLst/>
+          </a:prstGeom>
+          <a:noFill/>
+        </p:spPr>
+        <p:txBody>
+          <a:bodyPr wrap="square" rtlCol="0">
+            <a:spAutoFit/>
+          </a:bodyPr>
+          <a:lstStyle/>
+          <a:p>
+            <a:r>
+              <a:rPr lang="en-SG" dirty="0"/>
+              <a:t>0..1</a:t>
+            </a:r>
+          </a:p>
+        </p:txBody>
+      </p:sp>
+      <p:sp>
+        <p:nvSpPr>
+          <p:cNvPr id="79" name="Rectangle 78">
+            <a:extLst>
+              <a:ext uri="{FF2B5EF4-FFF2-40B4-BE49-F238E27FC236}">
+                <a16:creationId xmlns:a16="http://schemas.microsoft.com/office/drawing/2014/main" id="{EC457082-68CE-4F46-850E-7E52C1C388BD}"/>
+              </a:ext>
+            </a:extLst>
+          </p:cNvPr>
+          <p:cNvSpPr/>
+          <p:nvPr/>
+        </p:nvSpPr>
+        <p:spPr>
+          <a:xfrm>
+            <a:off x="771525" y="1034474"/>
+            <a:ext cx="10687048" cy="4474973"/>
+          </a:xfrm>
+          <a:prstGeom prst="rect">
+            <a:avLst/>
+          </a:prstGeom>
+          <a:noFill/>
+          <a:ln w="28575">
+            <a:solidFill>
+              <a:schemeClr val="tx1"/>
+            </a:solidFill>
+          </a:ln>
+        </p:spPr>
+        <p:style>
+          <a:lnRef idx="2">
+            <a:schemeClr val="accent1">
+              <a:shade val="50000"/>
+            </a:schemeClr>
+          </a:lnRef>
+          <a:fillRef idx="1">
+            <a:schemeClr val="accent1"/>
+          </a:fillRef>
+          <a:effectRef idx="0">
+            <a:schemeClr val="accent1"/>
+          </a:effectRef>
+          <a:fontRef idx="minor">
+            <a:schemeClr val="lt1"/>
+          </a:fontRef>
+        </p:style>
+        <p:txBody>
+          <a:bodyPr rtlCol="0" anchor="ctr"/>
+          <a:lstStyle/>
+          <a:p>
+            <a:pPr algn="ctr"/>
+            <a:endParaRPr lang="en-SG"/>
+          </a:p>
+        </p:txBody>
+      </p:sp>
+      <p:sp>
+        <p:nvSpPr>
+          <p:cNvPr id="80" name="TextBox 79">
+            <a:extLst>
+              <a:ext uri="{FF2B5EF4-FFF2-40B4-BE49-F238E27FC236}">
+                <a16:creationId xmlns:a16="http://schemas.microsoft.com/office/drawing/2014/main" id="{AC2437C7-8804-4B91-A0D1-EA68AB9B44AB}"/>
+              </a:ext>
+            </a:extLst>
+          </p:cNvPr>
+          <p:cNvSpPr txBox="1"/>
+          <p:nvPr/>
+        </p:nvSpPr>
+        <p:spPr>
+          <a:xfrm>
+            <a:off x="988347" y="1066485"/>
+            <a:ext cx="2545427" cy="461665"/>
+          </a:xfrm>
+          <a:prstGeom prst="rect">
+            <a:avLst/>
+          </a:prstGeom>
+          <a:noFill/>
+        </p:spPr>
+        <p:txBody>
+          <a:bodyPr wrap="square" rtlCol="0">
+            <a:spAutoFit/>
+          </a:bodyPr>
+          <a:lstStyle/>
+          <a:p>
+            <a:r>
+              <a:rPr lang="en-SG" sz="2400" b="1" dirty="0"/>
+              <a:t>Command classes</a:t>
+            </a:r>
+          </a:p>
+        </p:txBody>
+      </p:sp>
+    </p:spTree>
+    <p:extLst>
+      <p:ext uri="{BB962C8B-B14F-4D97-AF65-F5344CB8AC3E}">
+        <p14:creationId xmlns:p14="http://schemas.microsoft.com/office/powerpoint/2010/main" val="489241449"/>
+      </p:ext>
+    </p:extLst>
+  </p:cSld>
+  <p:clrMapOvr>
+    <a:masterClrMapping/>
+  </p:clrMapOvr>
+</p:sld>
+</file>
+
+<file path=ppt/slides/slide6.xml><?xml version="1.0" encoding="utf-8"?>
+<p:sld xmlns:a="http://schemas.openxmlformats.org/drawingml/2006/main" xmlns:r="http://schemas.openxmlformats.org/officeDocument/2006/relationships" xmlns:p="http://schemas.openxmlformats.org/presentationml/2006/main">
+  <p:cSld>
+    <p:spTree>
+      <p:nvGrpSpPr>
+        <p:cNvPr id="1" name=""/>
+        <p:cNvGrpSpPr/>
+        <p:nvPr/>
+      </p:nvGrpSpPr>
+      <p:grpSpPr>
+        <a:xfrm>
+          <a:off x="0" y="0"/>
+          <a:ext cx="0" cy="0"/>
+          <a:chOff x="0" y="0"/>
+          <a:chExt cx="0" cy="0"/>
+        </a:xfrm>
+      </p:grpSpPr>
+      <p:sp>
+        <p:nvSpPr>
+          <p:cNvPr id="4" name="Title 1">
+            <a:extLst>
+              <a:ext uri="{FF2B5EF4-FFF2-40B4-BE49-F238E27FC236}">
+                <a16:creationId xmlns:a16="http://schemas.microsoft.com/office/drawing/2014/main" id="{5678BC78-E3FC-48D8-980A-6490AB059F4B}"/>
+              </a:ext>
+            </a:extLst>
+          </p:cNvPr>
+          <p:cNvSpPr>
+            <a:spLocks noGrp="1"/>
+          </p:cNvSpPr>
+          <p:nvPr>
+            <p:ph type="title"/>
+          </p:nvPr>
+        </p:nvSpPr>
+        <p:spPr>
+          <a:xfrm>
+            <a:off x="228600" y="174626"/>
+            <a:ext cx="3087255" cy="567748"/>
+          </a:xfrm>
+        </p:spPr>
+        <p:txBody>
+          <a:bodyPr>
+            <a:normAutofit/>
+          </a:bodyPr>
+          <a:lstStyle/>
+          <a:p>
+            <a:r>
+              <a:rPr lang="en-SG" sz="2800" dirty="0">
+                <a:latin typeface="+mn-lt"/>
+              </a:rPr>
+              <a:t>Storage Diagram</a:t>
+            </a:r>
+          </a:p>
+        </p:txBody>
+      </p:sp>
+      <p:sp>
+        <p:nvSpPr>
+          <p:cNvPr id="9" name="Rectangle 8">
+            <a:extLst>
+              <a:ext uri="{FF2B5EF4-FFF2-40B4-BE49-F238E27FC236}">
+                <a16:creationId xmlns:a16="http://schemas.microsoft.com/office/drawing/2014/main" id="{F46BF3CC-E7D9-481B-AB34-212E53EBA93A}"/>
+              </a:ext>
+            </a:extLst>
+          </p:cNvPr>
+          <p:cNvSpPr/>
+          <p:nvPr/>
+        </p:nvSpPr>
+        <p:spPr>
+          <a:xfrm>
+            <a:off x="2283031" y="2737475"/>
+            <a:ext cx="1105659" cy="763683"/>
+          </a:xfrm>
+          <a:prstGeom prst="rect">
+            <a:avLst/>
+          </a:prstGeom>
+          <a:solidFill>
+            <a:schemeClr val="bg1"/>
+          </a:solidFill>
+          <a:ln w="28575">
+            <a:solidFill>
+              <a:schemeClr val="tx1"/>
+            </a:solidFill>
+          </a:ln>
+        </p:spPr>
+        <p:style>
+          <a:lnRef idx="2">
+            <a:schemeClr val="accent1">
+              <a:shade val="50000"/>
+            </a:schemeClr>
+          </a:lnRef>
+          <a:fillRef idx="1">
+            <a:schemeClr val="accent1"/>
+          </a:fillRef>
+          <a:effectRef idx="0">
+            <a:schemeClr val="accent1"/>
+          </a:effectRef>
+          <a:fontRef idx="minor">
+            <a:schemeClr val="lt1"/>
+          </a:fontRef>
+        </p:style>
+        <p:txBody>
+          <a:bodyPr rtlCol="0" anchor="ctr"/>
+          <a:lstStyle/>
+          <a:p>
+            <a:pPr algn="ctr"/>
+            <a:r>
+              <a:rPr lang="en-SG" dirty="0">
+                <a:solidFill>
+                  <a:schemeClr val="tx1"/>
+                </a:solidFill>
+              </a:rPr>
+              <a:t>MMM</a:t>
+            </a:r>
+          </a:p>
+        </p:txBody>
+      </p:sp>
+      <p:cxnSp>
+        <p:nvCxnSpPr>
+          <p:cNvPr id="10" name="Straight Arrow Connector 9">
+            <a:extLst>
+              <a:ext uri="{FF2B5EF4-FFF2-40B4-BE49-F238E27FC236}">
+                <a16:creationId xmlns:a16="http://schemas.microsoft.com/office/drawing/2014/main" id="{A8972ED1-EE87-4A20-B6E0-F0558A560512}"/>
+              </a:ext>
+            </a:extLst>
+          </p:cNvPr>
+          <p:cNvCxnSpPr>
+            <a:cxnSpLocks/>
+            <a:stCxn id="9" idx="3"/>
+          </p:cNvCxnSpPr>
+          <p:nvPr/>
+        </p:nvCxnSpPr>
+        <p:spPr>
+          <a:xfrm flipV="1">
+            <a:off x="3388690" y="3101340"/>
+            <a:ext cx="2348665" cy="17977"/>
+          </a:xfrm>
+          <a:prstGeom prst="straightConnector1">
+            <a:avLst/>
+          </a:prstGeom>
+          <a:ln w="28575" cap="flat" cmpd="sng" algn="ctr">
+            <a:solidFill>
+              <a:schemeClr val="dk1"/>
+            </a:solidFill>
+            <a:prstDash val="solid"/>
+            <a:round/>
+            <a:headEnd type="none" w="med" len="med"/>
+            <a:tailEnd type="arrow" w="med" len="med"/>
+          </a:ln>
+        </p:spPr>
+        <p:style>
+          <a:lnRef idx="0">
+            <a:scrgbClr r="0" g="0" b="0"/>
+          </a:lnRef>
+          <a:fillRef idx="0">
+            <a:scrgbClr r="0" g="0" b="0"/>
+          </a:fillRef>
+          <a:effectRef idx="0">
+            <a:scrgbClr r="0" g="0" b="0"/>
+          </a:effectRef>
+          <a:fontRef idx="minor">
+            <a:schemeClr val="tx1"/>
+          </a:fontRef>
+        </p:style>
+      </p:cxnSp>
+      <p:sp>
+        <p:nvSpPr>
+          <p:cNvPr id="15" name="Isosceles Triangle 14">
+            <a:extLst>
+              <a:ext uri="{FF2B5EF4-FFF2-40B4-BE49-F238E27FC236}">
+                <a16:creationId xmlns:a16="http://schemas.microsoft.com/office/drawing/2014/main" id="{6B0C4A49-6182-434B-B659-090DA62A9CD2}"/>
+              </a:ext>
+            </a:extLst>
+          </p:cNvPr>
+          <p:cNvSpPr/>
+          <p:nvPr/>
+        </p:nvSpPr>
+        <p:spPr>
+          <a:xfrm rot="5400000">
+            <a:off x="5252975" y="2877205"/>
+            <a:ext cx="132177" cy="102384"/>
+          </a:xfrm>
+          <a:prstGeom prst="triangle">
+            <a:avLst/>
+          </a:prstGeom>
+          <a:solidFill>
+            <a:schemeClr val="tx1"/>
+          </a:solidFill>
+          <a:ln>
+            <a:solidFill>
+              <a:schemeClr val="tx1"/>
+            </a:solidFill>
+          </a:ln>
+        </p:spPr>
+        <p:style>
+          <a:lnRef idx="2">
+            <a:schemeClr val="accent1">
+              <a:shade val="50000"/>
+            </a:schemeClr>
+          </a:lnRef>
+          <a:fillRef idx="1">
+            <a:schemeClr val="accent1"/>
+          </a:fillRef>
+          <a:effectRef idx="0">
+            <a:schemeClr val="accent1"/>
+          </a:effectRef>
+          <a:fontRef idx="minor">
+            <a:schemeClr val="lt1"/>
+          </a:fontRef>
+        </p:style>
+        <p:txBody>
+          <a:bodyPr rtlCol="0" anchor="ctr"/>
+          <a:lstStyle/>
+          <a:p>
+            <a:pPr algn="ctr"/>
+            <a:endParaRPr lang="en-SG"/>
+          </a:p>
+        </p:txBody>
+      </p:sp>
+      <p:sp>
+        <p:nvSpPr>
+          <p:cNvPr id="16" name="TextBox 15">
+            <a:extLst>
+              <a:ext uri="{FF2B5EF4-FFF2-40B4-BE49-F238E27FC236}">
+                <a16:creationId xmlns:a16="http://schemas.microsoft.com/office/drawing/2014/main" id="{75EB0395-E84B-451C-BFEA-9833014D4F96}"/>
+              </a:ext>
+            </a:extLst>
+          </p:cNvPr>
+          <p:cNvSpPr txBox="1"/>
+          <p:nvPr/>
+        </p:nvSpPr>
+        <p:spPr>
+          <a:xfrm>
+            <a:off x="4029075" y="2737475"/>
+            <a:ext cx="1341181" cy="369332"/>
+          </a:xfrm>
+          <a:prstGeom prst="rect">
+            <a:avLst/>
+          </a:prstGeom>
+          <a:noFill/>
+        </p:spPr>
+        <p:txBody>
+          <a:bodyPr wrap="square" rtlCol="0">
+            <a:spAutoFit/>
+          </a:bodyPr>
+          <a:lstStyle/>
+          <a:p>
+            <a:r>
+              <a:rPr lang="en-SG" dirty="0"/>
+              <a:t>loads/saves</a:t>
+            </a:r>
+          </a:p>
+        </p:txBody>
+      </p:sp>
+      <p:sp>
+        <p:nvSpPr>
+          <p:cNvPr id="17" name="TextBox 16">
+            <a:extLst>
+              <a:ext uri="{FF2B5EF4-FFF2-40B4-BE49-F238E27FC236}">
+                <a16:creationId xmlns:a16="http://schemas.microsoft.com/office/drawing/2014/main" id="{FE9F507F-E023-481A-9BFC-31159B743DC5}"/>
+              </a:ext>
+            </a:extLst>
+          </p:cNvPr>
+          <p:cNvSpPr txBox="1"/>
+          <p:nvPr/>
+        </p:nvSpPr>
+        <p:spPr>
+          <a:xfrm>
+            <a:off x="5443336" y="3119316"/>
+            <a:ext cx="294019" cy="369332"/>
+          </a:xfrm>
+          <a:prstGeom prst="rect">
+            <a:avLst/>
+          </a:prstGeom>
+          <a:noFill/>
+        </p:spPr>
+        <p:txBody>
+          <a:bodyPr wrap="square" rtlCol="0">
+            <a:spAutoFit/>
+          </a:bodyPr>
+          <a:lstStyle/>
+          <a:p>
+            <a:r>
+              <a:rPr lang="en-SG" dirty="0"/>
+              <a:t>1</a:t>
+            </a:r>
+          </a:p>
+        </p:txBody>
+      </p:sp>
+      <p:sp>
+        <p:nvSpPr>
+          <p:cNvPr id="32" name="Rectangle 31">
+            <a:extLst>
+              <a:ext uri="{FF2B5EF4-FFF2-40B4-BE49-F238E27FC236}">
+                <a16:creationId xmlns:a16="http://schemas.microsoft.com/office/drawing/2014/main" id="{4FF947D4-92B2-4C0C-BD38-F19766A3A505}"/>
+              </a:ext>
+            </a:extLst>
+          </p:cNvPr>
+          <p:cNvSpPr/>
+          <p:nvPr/>
+        </p:nvSpPr>
+        <p:spPr>
+          <a:xfrm>
+            <a:off x="4019551" y="1788314"/>
+            <a:ext cx="5638800" cy="2771442"/>
+          </a:xfrm>
+          <a:prstGeom prst="rect">
+            <a:avLst/>
+          </a:prstGeom>
+          <a:noFill/>
+          <a:ln w="28575">
+            <a:solidFill>
+              <a:schemeClr val="tx1"/>
+            </a:solidFill>
+          </a:ln>
+        </p:spPr>
+        <p:style>
+          <a:lnRef idx="2">
+            <a:schemeClr val="accent1">
+              <a:shade val="50000"/>
+            </a:schemeClr>
+          </a:lnRef>
+          <a:fillRef idx="1">
+            <a:schemeClr val="accent1"/>
+          </a:fillRef>
+          <a:effectRef idx="0">
+            <a:schemeClr val="accent1"/>
+          </a:effectRef>
+          <a:fontRef idx="minor">
+            <a:schemeClr val="lt1"/>
+          </a:fontRef>
+        </p:style>
+        <p:txBody>
+          <a:bodyPr rtlCol="0" anchor="ctr"/>
+          <a:lstStyle/>
+          <a:p>
+            <a:pPr algn="ctr"/>
+            <a:endParaRPr lang="en-SG"/>
+          </a:p>
+        </p:txBody>
+      </p:sp>
+      <p:sp>
+        <p:nvSpPr>
+          <p:cNvPr id="33" name="TextBox 32">
+            <a:extLst>
+              <a:ext uri="{FF2B5EF4-FFF2-40B4-BE49-F238E27FC236}">
+                <a16:creationId xmlns:a16="http://schemas.microsoft.com/office/drawing/2014/main" id="{39D26409-1609-4554-9195-50D6B0E5B9F1}"/>
+              </a:ext>
+            </a:extLst>
+          </p:cNvPr>
+          <p:cNvSpPr txBox="1"/>
+          <p:nvPr/>
+        </p:nvSpPr>
+        <p:spPr>
+          <a:xfrm>
+            <a:off x="8607939" y="1318308"/>
+            <a:ext cx="1380736" cy="461665"/>
+          </a:xfrm>
+          <a:prstGeom prst="rect">
+            <a:avLst/>
+          </a:prstGeom>
+          <a:noFill/>
+        </p:spPr>
+        <p:txBody>
+          <a:bodyPr wrap="square" rtlCol="0">
+            <a:spAutoFit/>
+          </a:bodyPr>
+          <a:lstStyle/>
+          <a:p>
+            <a:r>
+              <a:rPr lang="en-SG" sz="2400" dirty="0"/>
+              <a:t>Storage</a:t>
+            </a:r>
+          </a:p>
+        </p:txBody>
+      </p:sp>
+      <p:graphicFrame>
+        <p:nvGraphicFramePr>
+          <p:cNvPr id="34" name="Table 33">
+            <a:extLst>
+              <a:ext uri="{FF2B5EF4-FFF2-40B4-BE49-F238E27FC236}">
+                <a16:creationId xmlns:a16="http://schemas.microsoft.com/office/drawing/2014/main" id="{C970D884-EF66-47C5-A329-62947697444E}"/>
+              </a:ext>
+            </a:extLst>
+          </p:cNvPr>
+          <p:cNvGraphicFramePr>
+            <a:graphicFrameLocks noGrp="1"/>
+          </p:cNvGraphicFramePr>
+          <p:nvPr>
+            <p:extLst>
+              <p:ext uri="{D42A27DB-BD31-4B8C-83A1-F6EECF244321}">
+                <p14:modId xmlns:p14="http://schemas.microsoft.com/office/powerpoint/2010/main" val="1807087211"/>
+              </p:ext>
+            </p:extLst>
+          </p:nvPr>
+        </p:nvGraphicFramePr>
+        <p:xfrm>
+          <a:off x="5737355" y="2233297"/>
+          <a:ext cx="3644770" cy="1736086"/>
+        </p:xfrm>
+        <a:graphic>
+          <a:graphicData uri="http://schemas.openxmlformats.org/drawingml/2006/table">
+            <a:tbl>
+              <a:tblPr firstRow="1" bandRow="1">
+                <a:tableStyleId>{5C22544A-7EE6-4342-B048-85BDC9FD1C3A}</a:tableStyleId>
+              </a:tblPr>
+              <a:tblGrid>
+                <a:gridCol w="3644770">
+                  <a:extLst>
+                    <a:ext uri="{9D8B030D-6E8A-4147-A177-3AD203B41FA5}">
+                      <a16:colId xmlns:a16="http://schemas.microsoft.com/office/drawing/2014/main" val="707672643"/>
+                    </a:ext>
+                  </a:extLst>
+                </a:gridCol>
+              </a:tblGrid>
+              <a:tr h="450846">
+                <a:tc>
+                  <a:txBody>
+                    <a:bodyPr/>
+                    <a:lstStyle/>
+                    <a:p>
+                      <a:pPr algn="ctr"/>
+                      <a:r>
+                        <a:rPr lang="en-SG" b="1" dirty="0">
+                          <a:solidFill>
+                            <a:schemeClr val="tx1"/>
+                          </a:solidFill>
+                        </a:rPr>
+                        <a:t>Storage</a:t>
+                      </a:r>
+                    </a:p>
+                  </a:txBody>
+                  <a:tcPr>
+                    <a:solidFill>
+                      <a:srgbClr val="FFC000"/>
+                    </a:solidFill>
+                  </a:tcPr>
+                </a:tc>
+                <a:extLst>
+                  <a:ext uri="{0D108BD9-81ED-4DB2-BD59-A6C34878D82A}">
+                    <a16:rowId xmlns:a16="http://schemas.microsoft.com/office/drawing/2014/main" val="1827793671"/>
+                  </a:ext>
+                </a:extLst>
+              </a:tr>
+              <a:tr h="370840">
+                <a:tc>
+                  <a:txBody>
+                    <a:bodyPr/>
+                    <a:lstStyle/>
+                    <a:p>
+                      <a:pPr marL="0" indent="0">
+                        <a:buFontTx/>
+                        <a:buNone/>
+                      </a:pPr>
+                      <a:r>
+                        <a:rPr lang="en-SG" dirty="0"/>
+                        <a:t>- </a:t>
+                      </a:r>
+                      <a:r>
+                        <a:rPr lang="en-SG" dirty="0" err="1"/>
+                        <a:t>storageFile</a:t>
+                      </a:r>
+                      <a:r>
+                        <a:rPr lang="en-SG" dirty="0"/>
+                        <a:t>: File</a:t>
+                      </a:r>
+                    </a:p>
+                  </a:txBody>
+                  <a:tcPr>
+                    <a:solidFill>
+                      <a:srgbClr val="FFCC66"/>
+                    </a:solidFill>
+                  </a:tcPr>
+                </a:tc>
+                <a:extLst>
+                  <a:ext uri="{0D108BD9-81ED-4DB2-BD59-A6C34878D82A}">
+                    <a16:rowId xmlns:a16="http://schemas.microsoft.com/office/drawing/2014/main" val="2448862544"/>
+                  </a:ext>
+                </a:extLst>
+              </a:tr>
+              <a:tr h="370840">
+                <a:tc>
+                  <a:txBody>
+                    <a:bodyPr/>
+                    <a:lstStyle/>
+                    <a:p>
+                      <a:r>
+                        <a:rPr lang="en-SG" dirty="0"/>
+                        <a:t>+ load: </a:t>
+                      </a:r>
+                      <a:r>
+                        <a:rPr lang="en-SG" dirty="0" err="1"/>
+                        <a:t>ExpenditureList</a:t>
+                      </a:r>
+                      <a:endParaRPr lang="en-SG" dirty="0"/>
+                    </a:p>
+                    <a:p>
+                      <a:r>
+                        <a:rPr lang="en-SG" dirty="0"/>
+                        <a:t>+ save(</a:t>
+                      </a:r>
+                      <a:r>
+                        <a:rPr lang="en-SG" dirty="0" err="1"/>
+                        <a:t>listToSave</a:t>
+                      </a:r>
+                      <a:r>
+                        <a:rPr lang="en-SG" dirty="0"/>
+                        <a:t>: </a:t>
+                      </a:r>
+                      <a:r>
+                        <a:rPr lang="en-SG" dirty="0" err="1"/>
+                        <a:t>ExpenditureList</a:t>
+                      </a:r>
+                      <a:r>
+                        <a:rPr lang="en-SG" dirty="0"/>
+                        <a:t>): void</a:t>
+                      </a:r>
+                    </a:p>
+                  </a:txBody>
+                  <a:tcPr>
+                    <a:solidFill>
+                      <a:srgbClr val="FFCC66"/>
+                    </a:solidFill>
+                  </a:tcPr>
+                </a:tc>
+                <a:extLst>
+                  <a:ext uri="{0D108BD9-81ED-4DB2-BD59-A6C34878D82A}">
+                    <a16:rowId xmlns:a16="http://schemas.microsoft.com/office/drawing/2014/main" val="1160959692"/>
+                  </a:ext>
+                </a:extLst>
+              </a:tr>
+            </a:tbl>
+          </a:graphicData>
+        </a:graphic>
+      </p:graphicFrame>
+    </p:spTree>
+    <p:extLst>
+      <p:ext uri="{BB962C8B-B14F-4D97-AF65-F5344CB8AC3E}">
+        <p14:creationId xmlns:p14="http://schemas.microsoft.com/office/powerpoint/2010/main" val="2846970170"/>
       </p:ext>
     </p:extLst>
   </p:cSld>

</xml_diff>

<commit_message>
Update addIncome portion of DG
</commit_message>
<xml_diff>
--- a/UML_Diagrams.pptx
+++ b/UML_Diagrams.pptx
@@ -9,8 +9,9 @@
     <p:sldId id="259" r:id="rId3"/>
     <p:sldId id="257" r:id="rId4"/>
     <p:sldId id="258" r:id="rId5"/>
-    <p:sldId id="260" r:id="rId6"/>
-    <p:sldId id="261" r:id="rId7"/>
+    <p:sldId id="262" r:id="rId6"/>
+    <p:sldId id="260" r:id="rId7"/>
+    <p:sldId id="261" r:id="rId8"/>
   </p:sldIdLst>
   <p:sldSz cx="12192000" cy="6858000"/>
   <p:notesSz cx="6858000" cy="9144000"/>
@@ -266,7 +267,7 @@
           <a:p>
             <a:fld id="{756B03D5-F1B6-433B-AEBF-A0D421B4E27D}" type="datetimeFigureOut">
               <a:rPr lang="en-SG" smtClean="0"/>
-              <a:t>23/3/2022</a:t>
+              <a:t>6/4/2022</a:t>
             </a:fld>
             <a:endParaRPr lang="en-SG"/>
           </a:p>
@@ -466,7 +467,7 @@
           <a:p>
             <a:fld id="{756B03D5-F1B6-433B-AEBF-A0D421B4E27D}" type="datetimeFigureOut">
               <a:rPr lang="en-SG" smtClean="0"/>
-              <a:t>23/3/2022</a:t>
+              <a:t>6/4/2022</a:t>
             </a:fld>
             <a:endParaRPr lang="en-SG"/>
           </a:p>
@@ -676,7 +677,7 @@
           <a:p>
             <a:fld id="{756B03D5-F1B6-433B-AEBF-A0D421B4E27D}" type="datetimeFigureOut">
               <a:rPr lang="en-SG" smtClean="0"/>
-              <a:t>23/3/2022</a:t>
+              <a:t>6/4/2022</a:t>
             </a:fld>
             <a:endParaRPr lang="en-SG"/>
           </a:p>
@@ -876,7 +877,7 @@
           <a:p>
             <a:fld id="{756B03D5-F1B6-433B-AEBF-A0D421B4E27D}" type="datetimeFigureOut">
               <a:rPr lang="en-SG" smtClean="0"/>
-              <a:t>23/3/2022</a:t>
+              <a:t>6/4/2022</a:t>
             </a:fld>
             <a:endParaRPr lang="en-SG"/>
           </a:p>
@@ -1152,7 +1153,7 @@
           <a:p>
             <a:fld id="{756B03D5-F1B6-433B-AEBF-A0D421B4E27D}" type="datetimeFigureOut">
               <a:rPr lang="en-SG" smtClean="0"/>
-              <a:t>23/3/2022</a:t>
+              <a:t>6/4/2022</a:t>
             </a:fld>
             <a:endParaRPr lang="en-SG"/>
           </a:p>
@@ -1420,7 +1421,7 @@
           <a:p>
             <a:fld id="{756B03D5-F1B6-433B-AEBF-A0D421B4E27D}" type="datetimeFigureOut">
               <a:rPr lang="en-SG" smtClean="0"/>
-              <a:t>23/3/2022</a:t>
+              <a:t>6/4/2022</a:t>
             </a:fld>
             <a:endParaRPr lang="en-SG"/>
           </a:p>
@@ -1835,7 +1836,7 @@
           <a:p>
             <a:fld id="{756B03D5-F1B6-433B-AEBF-A0D421B4E27D}" type="datetimeFigureOut">
               <a:rPr lang="en-SG" smtClean="0"/>
-              <a:t>23/3/2022</a:t>
+              <a:t>6/4/2022</a:t>
             </a:fld>
             <a:endParaRPr lang="en-SG"/>
           </a:p>
@@ -1977,7 +1978,7 @@
           <a:p>
             <a:fld id="{756B03D5-F1B6-433B-AEBF-A0D421B4E27D}" type="datetimeFigureOut">
               <a:rPr lang="en-SG" smtClean="0"/>
-              <a:t>23/3/2022</a:t>
+              <a:t>6/4/2022</a:t>
             </a:fld>
             <a:endParaRPr lang="en-SG"/>
           </a:p>
@@ -2090,7 +2091,7 @@
           <a:p>
             <a:fld id="{756B03D5-F1B6-433B-AEBF-A0D421B4E27D}" type="datetimeFigureOut">
               <a:rPr lang="en-SG" smtClean="0"/>
-              <a:t>23/3/2022</a:t>
+              <a:t>6/4/2022</a:t>
             </a:fld>
             <a:endParaRPr lang="en-SG"/>
           </a:p>
@@ -2403,7 +2404,7 @@
           <a:p>
             <a:fld id="{756B03D5-F1B6-433B-AEBF-A0D421B4E27D}" type="datetimeFigureOut">
               <a:rPr lang="en-SG" smtClean="0"/>
-              <a:t>23/3/2022</a:t>
+              <a:t>6/4/2022</a:t>
             </a:fld>
             <a:endParaRPr lang="en-SG"/>
           </a:p>
@@ -2692,7 +2693,7 @@
           <a:p>
             <a:fld id="{756B03D5-F1B6-433B-AEBF-A0D421B4E27D}" type="datetimeFigureOut">
               <a:rPr lang="en-SG" smtClean="0"/>
-              <a:t>23/3/2022</a:t>
+              <a:t>6/4/2022</a:t>
             </a:fld>
             <a:endParaRPr lang="en-SG"/>
           </a:p>
@@ -2935,7 +2936,7 @@
           <a:p>
             <a:fld id="{756B03D5-F1B6-433B-AEBF-A0D421B4E27D}" type="datetimeFigureOut">
               <a:rPr lang="en-SG" smtClean="0"/>
-              <a:t>23/3/2022</a:t>
+              <a:t>6/4/2022</a:t>
             </a:fld>
             <a:endParaRPr lang="en-SG"/>
           </a:p>
@@ -5985,7 +5986,7 @@
           <p:nvPr>
             <p:extLst>
               <p:ext uri="{D42A27DB-BD31-4B8C-83A1-F6EECF244321}">
-                <p14:modId xmlns:p14="http://schemas.microsoft.com/office/powerpoint/2010/main" val="3533219256"/>
+                <p14:modId xmlns:p14="http://schemas.microsoft.com/office/powerpoint/2010/main" val="1891678668"/>
               </p:ext>
             </p:extLst>
           </p:nvPr>
@@ -6293,7 +6294,7 @@
             <a:avLst/>
           </a:prstGeom>
           <a:solidFill>
-            <a:schemeClr val="bg1"/>
+            <a:srgbClr val="DDDDDD"/>
           </a:solidFill>
           <a:ln w="28575">
             <a:solidFill>
@@ -6323,7 +6324,7 @@
           <a:p>
             <a:pPr algn="ctr"/>
             <a:r>
-              <a:rPr lang="en-SG" dirty="0">
+              <a:rPr lang="en-SG" b="1" dirty="0">
                 <a:solidFill>
                   <a:schemeClr val="tx1"/>
                 </a:solidFill>
@@ -6464,7 +6465,7 @@
           <a:p>
             <a:r>
               <a:rPr lang="en-SG" sz="2400" dirty="0"/>
-              <a:t>UI</a:t>
+              <a:t>Ui</a:t>
             </a:r>
           </a:p>
         </p:txBody>
@@ -6708,7 +6709,7 @@
           <p:nvPr>
             <p:extLst>
               <p:ext uri="{D42A27DB-BD31-4B8C-83A1-F6EECF244321}">
-                <p14:modId xmlns:p14="http://schemas.microsoft.com/office/powerpoint/2010/main" val="1944921990"/>
+                <p14:modId xmlns:p14="http://schemas.microsoft.com/office/powerpoint/2010/main" val="1514405924"/>
               </p:ext>
             </p:extLst>
           </p:nvPr>
@@ -6771,7 +6772,7 @@
                     <a:p>
                       <a:r>
                         <a:rPr lang="en-SG" u="sng" dirty="0"/>
-                        <a:t>+ parseCommand(input: String, itemList: ExpenditureList): Command</a:t>
+                        <a:t>+ parseCommand(input: String, user: User): Command</a:t>
                       </a:r>
                     </a:p>
                     <a:p>
@@ -6812,14 +6813,14 @@
           <p:nvPr>
             <p:extLst>
               <p:ext uri="{D42A27DB-BD31-4B8C-83A1-F6EECF244321}">
-                <p14:modId xmlns:p14="http://schemas.microsoft.com/office/powerpoint/2010/main" val="1471449694"/>
+                <p14:modId xmlns:p14="http://schemas.microsoft.com/office/powerpoint/2010/main" val="1569680413"/>
               </p:ext>
             </p:extLst>
           </p:nvPr>
         </p:nvGraphicFramePr>
         <p:xfrm>
-          <a:off x="7308980" y="1436915"/>
-          <a:ext cx="3111238" cy="1781563"/>
+          <a:off x="7308980" y="1436916"/>
+          <a:ext cx="3111238" cy="2484644"/>
         </p:xfrm>
         <a:graphic>
           <a:graphicData uri="http://schemas.openxmlformats.org/drawingml/2006/table">
@@ -6836,7 +6837,7 @@
                   </a:extLst>
                 </a:gridCol>
               </a:tblGrid>
-              <a:tr h="501403">
+              <a:tr h="381524">
                 <a:tc>
                   <a:txBody>
                     <a:bodyPr/>
@@ -6851,7 +6852,7 @@
                             </a:schemeClr>
                           </a:solidFill>
                         </a:rPr>
-                        <a:t>ExpenditureList</a:t>
+                        <a:t>User</a:t>
                       </a:r>
                     </a:p>
                   </a:txBody>
@@ -6867,7 +6868,7 @@
                   </a:ext>
                 </a:extLst>
               </a:tr>
-              <a:tr h="597926">
+              <a:tr h="1503891">
                 <a:tc>
                   <a:txBody>
                     <a:bodyPr/>
@@ -6875,7 +6876,35 @@
                     <a:p>
                       <a:r>
                         <a:rPr lang="en-SG" dirty="0"/>
-                        <a:t>+ expenditureListArray: ArrayList&lt;Expenditure&gt;</a:t>
+                        <a:t>+ expenditureListArray: ExpenditureList</a:t>
+                      </a:r>
+                    </a:p>
+                    <a:p>
+                      <a:r>
+                        <a:rPr lang="en-SG" dirty="0"/>
+                        <a:t>+ </a:t>
+                      </a:r>
+                      <a:r>
+                        <a:rPr lang="en-SG" dirty="0" err="1"/>
+                        <a:t>creditCardListArray</a:t>
+                      </a:r>
+                      <a:r>
+                        <a:rPr lang="en-SG" dirty="0"/>
+                        <a:t>: CreditCardList</a:t>
+                      </a:r>
+                    </a:p>
+                    <a:p>
+                      <a:r>
+                        <a:rPr lang="en-SG" dirty="0"/>
+                        <a:t>+ </a:t>
+                      </a:r>
+                      <a:r>
+                        <a:rPr lang="en-SG" dirty="0" err="1"/>
+                        <a:t>incomeListArray</a:t>
+                      </a:r>
+                      <a:r>
+                        <a:rPr lang="en-SG" dirty="0"/>
+                        <a:t>: IncomeList</a:t>
                       </a:r>
                     </a:p>
                     <a:p>
@@ -6897,7 +6926,7 @@
                   </a:ext>
                 </a:extLst>
               </a:tr>
-              <a:tr h="341672">
+              <a:tr h="316609">
                 <a:tc>
                   <a:txBody>
                     <a:bodyPr/>
@@ -7199,7 +7228,7 @@
             <a:avLst/>
           </a:prstGeom>
           <a:solidFill>
-            <a:schemeClr val="bg1"/>
+            <a:srgbClr val="DDDDDD"/>
           </a:solidFill>
           <a:ln w="28575">
             <a:solidFill>
@@ -7229,7 +7258,7 @@
           <a:p>
             <a:pPr algn="ctr"/>
             <a:r>
-              <a:rPr lang="en-SG" dirty="0">
+              <a:rPr lang="en-SG" b="1" dirty="0">
                 <a:solidFill>
                   <a:schemeClr val="tx1"/>
                 </a:solidFill>
@@ -7628,6 +7657,1620 @@
       </p:grpSpPr>
       <p:sp>
         <p:nvSpPr>
+          <p:cNvPr id="4" name="Rectangle 3">
+            <a:extLst>
+              <a:ext uri="{FF2B5EF4-FFF2-40B4-BE49-F238E27FC236}">
+                <a16:creationId xmlns:a16="http://schemas.microsoft.com/office/drawing/2014/main" id="{AD59BEE8-FA50-45B9-BA4B-12BF6C8FA083}"/>
+              </a:ext>
+            </a:extLst>
+          </p:cNvPr>
+          <p:cNvSpPr/>
+          <p:nvPr/>
+        </p:nvSpPr>
+        <p:spPr>
+          <a:xfrm>
+            <a:off x="1068869" y="2665317"/>
+            <a:ext cx="1105659" cy="763683"/>
+          </a:xfrm>
+          <a:prstGeom prst="rect">
+            <a:avLst/>
+          </a:prstGeom>
+          <a:solidFill>
+            <a:srgbClr val="DDDDDD"/>
+          </a:solidFill>
+          <a:ln w="28575">
+            <a:solidFill>
+              <a:schemeClr val="tx1"/>
+            </a:solidFill>
+          </a:ln>
+        </p:spPr>
+        <p:style>
+          <a:lnRef idx="2">
+            <a:schemeClr val="accent1">
+              <a:shade val="50000"/>
+            </a:schemeClr>
+          </a:lnRef>
+          <a:fillRef idx="1">
+            <a:schemeClr val="accent1"/>
+          </a:fillRef>
+          <a:effectRef idx="0">
+            <a:schemeClr val="accent1"/>
+          </a:effectRef>
+          <a:fontRef idx="minor">
+            <a:schemeClr val="lt1"/>
+          </a:fontRef>
+        </p:style>
+        <p:txBody>
+          <a:bodyPr rtlCol="0" anchor="ctr"/>
+          <a:lstStyle/>
+          <a:p>
+            <a:pPr algn="ctr"/>
+            <a:r>
+              <a:rPr lang="en-SG" b="1" dirty="0">
+                <a:solidFill>
+                  <a:schemeClr val="tx1"/>
+                </a:solidFill>
+              </a:rPr>
+              <a:t>MMM</a:t>
+            </a:r>
+          </a:p>
+        </p:txBody>
+      </p:sp>
+      <p:sp>
+        <p:nvSpPr>
+          <p:cNvPr id="5" name="Rectangle 4">
+            <a:extLst>
+              <a:ext uri="{FF2B5EF4-FFF2-40B4-BE49-F238E27FC236}">
+                <a16:creationId xmlns:a16="http://schemas.microsoft.com/office/drawing/2014/main" id="{20786097-B614-4071-A9C4-0FB72C17779B}"/>
+              </a:ext>
+            </a:extLst>
+          </p:cNvPr>
+          <p:cNvSpPr/>
+          <p:nvPr/>
+        </p:nvSpPr>
+        <p:spPr>
+          <a:xfrm>
+            <a:off x="3119172" y="2752354"/>
+            <a:ext cx="1346430" cy="589607"/>
+          </a:xfrm>
+          <a:prstGeom prst="rect">
+            <a:avLst/>
+          </a:prstGeom>
+          <a:solidFill>
+            <a:srgbClr val="00B0F0"/>
+          </a:solidFill>
+          <a:ln w="28575">
+            <a:solidFill>
+              <a:schemeClr val="tx1"/>
+            </a:solidFill>
+          </a:ln>
+        </p:spPr>
+        <p:style>
+          <a:lnRef idx="2">
+            <a:schemeClr val="accent1">
+              <a:shade val="50000"/>
+            </a:schemeClr>
+          </a:lnRef>
+          <a:fillRef idx="1">
+            <a:schemeClr val="accent1"/>
+          </a:fillRef>
+          <a:effectRef idx="0">
+            <a:schemeClr val="accent1"/>
+          </a:effectRef>
+          <a:fontRef idx="minor">
+            <a:schemeClr val="lt1"/>
+          </a:fontRef>
+        </p:style>
+        <p:txBody>
+          <a:bodyPr rtlCol="0" anchor="ctr"/>
+          <a:lstStyle/>
+          <a:p>
+            <a:pPr algn="ctr"/>
+            <a:r>
+              <a:rPr lang="en-SG" b="1" dirty="0">
+                <a:solidFill>
+                  <a:schemeClr val="tx1"/>
+                </a:solidFill>
+              </a:rPr>
+              <a:t>Parser</a:t>
+            </a:r>
+          </a:p>
+        </p:txBody>
+      </p:sp>
+      <p:sp>
+        <p:nvSpPr>
+          <p:cNvPr id="6" name="Rectangle 5">
+            <a:extLst>
+              <a:ext uri="{FF2B5EF4-FFF2-40B4-BE49-F238E27FC236}">
+                <a16:creationId xmlns:a16="http://schemas.microsoft.com/office/drawing/2014/main" id="{B2A89B24-DCF8-4C03-B44D-3C72A0C79B00}"/>
+              </a:ext>
+            </a:extLst>
+          </p:cNvPr>
+          <p:cNvSpPr/>
+          <p:nvPr/>
+        </p:nvSpPr>
+        <p:spPr>
+          <a:xfrm>
+            <a:off x="3130316" y="4013107"/>
+            <a:ext cx="1346430" cy="589607"/>
+          </a:xfrm>
+          <a:prstGeom prst="rect">
+            <a:avLst/>
+          </a:prstGeom>
+          <a:solidFill>
+            <a:srgbClr val="00B0F0"/>
+          </a:solidFill>
+          <a:ln w="28575">
+            <a:solidFill>
+              <a:schemeClr val="tx1"/>
+            </a:solidFill>
+          </a:ln>
+        </p:spPr>
+        <p:style>
+          <a:lnRef idx="2">
+            <a:schemeClr val="accent1">
+              <a:shade val="50000"/>
+            </a:schemeClr>
+          </a:lnRef>
+          <a:fillRef idx="1">
+            <a:schemeClr val="accent1"/>
+          </a:fillRef>
+          <a:effectRef idx="0">
+            <a:schemeClr val="accent1"/>
+          </a:effectRef>
+          <a:fontRef idx="minor">
+            <a:schemeClr val="lt1"/>
+          </a:fontRef>
+        </p:style>
+        <p:txBody>
+          <a:bodyPr rtlCol="0" anchor="ctr"/>
+          <a:lstStyle/>
+          <a:p>
+            <a:pPr algn="ctr"/>
+            <a:r>
+              <a:rPr lang="en-SG" b="1" dirty="0">
+                <a:solidFill>
+                  <a:schemeClr val="tx1"/>
+                </a:solidFill>
+              </a:rPr>
+              <a:t>Functions</a:t>
+            </a:r>
+          </a:p>
+        </p:txBody>
+      </p:sp>
+      <p:sp>
+        <p:nvSpPr>
+          <p:cNvPr id="7" name="Rectangle 6">
+            <a:extLst>
+              <a:ext uri="{FF2B5EF4-FFF2-40B4-BE49-F238E27FC236}">
+                <a16:creationId xmlns:a16="http://schemas.microsoft.com/office/drawing/2014/main" id="{A0B1C7A0-700D-4EE5-B420-420C2C642EAA}"/>
+              </a:ext>
+            </a:extLst>
+          </p:cNvPr>
+          <p:cNvSpPr/>
+          <p:nvPr/>
+        </p:nvSpPr>
+        <p:spPr>
+          <a:xfrm>
+            <a:off x="5226549" y="2752354"/>
+            <a:ext cx="1346430" cy="589607"/>
+          </a:xfrm>
+          <a:prstGeom prst="rect">
+            <a:avLst/>
+          </a:prstGeom>
+          <a:solidFill>
+            <a:srgbClr val="00B0F0"/>
+          </a:solidFill>
+          <a:ln w="28575">
+            <a:solidFill>
+              <a:schemeClr val="tx1"/>
+            </a:solidFill>
+          </a:ln>
+        </p:spPr>
+        <p:style>
+          <a:lnRef idx="2">
+            <a:schemeClr val="accent1">
+              <a:shade val="50000"/>
+            </a:schemeClr>
+          </a:lnRef>
+          <a:fillRef idx="1">
+            <a:schemeClr val="accent1"/>
+          </a:fillRef>
+          <a:effectRef idx="0">
+            <a:schemeClr val="accent1"/>
+          </a:effectRef>
+          <a:fontRef idx="minor">
+            <a:schemeClr val="lt1"/>
+          </a:fontRef>
+        </p:style>
+        <p:txBody>
+          <a:bodyPr rtlCol="0" anchor="ctr"/>
+          <a:lstStyle/>
+          <a:p>
+            <a:pPr algn="ctr"/>
+            <a:r>
+              <a:rPr lang="en-SG" b="1" dirty="0">
+                <a:solidFill>
+                  <a:schemeClr val="tx1"/>
+                </a:solidFill>
+              </a:rPr>
+              <a:t>User</a:t>
+            </a:r>
+          </a:p>
+        </p:txBody>
+      </p:sp>
+      <p:sp>
+        <p:nvSpPr>
+          <p:cNvPr id="8" name="Rectangle 7">
+            <a:extLst>
+              <a:ext uri="{FF2B5EF4-FFF2-40B4-BE49-F238E27FC236}">
+                <a16:creationId xmlns:a16="http://schemas.microsoft.com/office/drawing/2014/main" id="{6C5E3802-7B02-4479-AB39-0149436DD0FF}"/>
+              </a:ext>
+            </a:extLst>
+          </p:cNvPr>
+          <p:cNvSpPr/>
+          <p:nvPr/>
+        </p:nvSpPr>
+        <p:spPr>
+          <a:xfrm>
+            <a:off x="7416924" y="1779597"/>
+            <a:ext cx="1777399" cy="589607"/>
+          </a:xfrm>
+          <a:prstGeom prst="rect">
+            <a:avLst/>
+          </a:prstGeom>
+          <a:solidFill>
+            <a:srgbClr val="00B0F0"/>
+          </a:solidFill>
+          <a:ln w="28575">
+            <a:solidFill>
+              <a:schemeClr val="tx1"/>
+            </a:solidFill>
+          </a:ln>
+        </p:spPr>
+        <p:style>
+          <a:lnRef idx="2">
+            <a:schemeClr val="accent1">
+              <a:shade val="50000"/>
+            </a:schemeClr>
+          </a:lnRef>
+          <a:fillRef idx="1">
+            <a:schemeClr val="accent1"/>
+          </a:fillRef>
+          <a:effectRef idx="0">
+            <a:schemeClr val="accent1"/>
+          </a:effectRef>
+          <a:fontRef idx="minor">
+            <a:schemeClr val="lt1"/>
+          </a:fontRef>
+        </p:style>
+        <p:txBody>
+          <a:bodyPr rtlCol="0" anchor="ctr"/>
+          <a:lstStyle/>
+          <a:p>
+            <a:pPr algn="ctr"/>
+            <a:r>
+              <a:rPr lang="en-SG" b="1" dirty="0">
+                <a:solidFill>
+                  <a:schemeClr val="tx1"/>
+                </a:solidFill>
+              </a:rPr>
+              <a:t>ExpenditureList</a:t>
+            </a:r>
+          </a:p>
+        </p:txBody>
+      </p:sp>
+      <p:sp>
+        <p:nvSpPr>
+          <p:cNvPr id="9" name="Rectangle 8">
+            <a:extLst>
+              <a:ext uri="{FF2B5EF4-FFF2-40B4-BE49-F238E27FC236}">
+                <a16:creationId xmlns:a16="http://schemas.microsoft.com/office/drawing/2014/main" id="{054D7409-E6D3-4265-89E2-2DCB659B1C67}"/>
+              </a:ext>
+            </a:extLst>
+          </p:cNvPr>
+          <p:cNvSpPr/>
+          <p:nvPr/>
+        </p:nvSpPr>
+        <p:spPr>
+          <a:xfrm>
+            <a:off x="7416924" y="2752353"/>
+            <a:ext cx="1777399" cy="589607"/>
+          </a:xfrm>
+          <a:prstGeom prst="rect">
+            <a:avLst/>
+          </a:prstGeom>
+          <a:solidFill>
+            <a:srgbClr val="00B0F0"/>
+          </a:solidFill>
+          <a:ln w="28575">
+            <a:solidFill>
+              <a:schemeClr val="tx1"/>
+            </a:solidFill>
+          </a:ln>
+        </p:spPr>
+        <p:style>
+          <a:lnRef idx="2">
+            <a:schemeClr val="accent1">
+              <a:shade val="50000"/>
+            </a:schemeClr>
+          </a:lnRef>
+          <a:fillRef idx="1">
+            <a:schemeClr val="accent1"/>
+          </a:fillRef>
+          <a:effectRef idx="0">
+            <a:schemeClr val="accent1"/>
+          </a:effectRef>
+          <a:fontRef idx="minor">
+            <a:schemeClr val="lt1"/>
+          </a:fontRef>
+        </p:style>
+        <p:txBody>
+          <a:bodyPr rtlCol="0" anchor="ctr"/>
+          <a:lstStyle/>
+          <a:p>
+            <a:pPr algn="ctr"/>
+            <a:r>
+              <a:rPr lang="en-SG" b="1" dirty="0">
+                <a:solidFill>
+                  <a:schemeClr val="tx1"/>
+                </a:solidFill>
+              </a:rPr>
+              <a:t>CreditCardList</a:t>
+            </a:r>
+          </a:p>
+        </p:txBody>
+      </p:sp>
+      <p:sp>
+        <p:nvSpPr>
+          <p:cNvPr id="10" name="Rectangle 9">
+            <a:extLst>
+              <a:ext uri="{FF2B5EF4-FFF2-40B4-BE49-F238E27FC236}">
+                <a16:creationId xmlns:a16="http://schemas.microsoft.com/office/drawing/2014/main" id="{9A013524-9E0D-4DFA-A17F-9BDD89711920}"/>
+              </a:ext>
+            </a:extLst>
+          </p:cNvPr>
+          <p:cNvSpPr/>
+          <p:nvPr/>
+        </p:nvSpPr>
+        <p:spPr>
+          <a:xfrm>
+            <a:off x="7416924" y="3725109"/>
+            <a:ext cx="1777399" cy="589607"/>
+          </a:xfrm>
+          <a:prstGeom prst="rect">
+            <a:avLst/>
+          </a:prstGeom>
+          <a:solidFill>
+            <a:srgbClr val="00B0F0"/>
+          </a:solidFill>
+          <a:ln w="28575">
+            <a:solidFill>
+              <a:schemeClr val="tx1"/>
+            </a:solidFill>
+          </a:ln>
+        </p:spPr>
+        <p:style>
+          <a:lnRef idx="2">
+            <a:schemeClr val="accent1">
+              <a:shade val="50000"/>
+            </a:schemeClr>
+          </a:lnRef>
+          <a:fillRef idx="1">
+            <a:schemeClr val="accent1"/>
+          </a:fillRef>
+          <a:effectRef idx="0">
+            <a:schemeClr val="accent1"/>
+          </a:effectRef>
+          <a:fontRef idx="minor">
+            <a:schemeClr val="lt1"/>
+          </a:fontRef>
+        </p:style>
+        <p:txBody>
+          <a:bodyPr rtlCol="0" anchor="ctr"/>
+          <a:lstStyle/>
+          <a:p>
+            <a:pPr algn="ctr"/>
+            <a:r>
+              <a:rPr lang="en-SG" b="1" dirty="0">
+                <a:solidFill>
+                  <a:schemeClr val="tx1"/>
+                </a:solidFill>
+              </a:rPr>
+              <a:t>IncomeList</a:t>
+            </a:r>
+          </a:p>
+        </p:txBody>
+      </p:sp>
+      <p:sp>
+        <p:nvSpPr>
+          <p:cNvPr id="11" name="Rectangle 10">
+            <a:extLst>
+              <a:ext uri="{FF2B5EF4-FFF2-40B4-BE49-F238E27FC236}">
+                <a16:creationId xmlns:a16="http://schemas.microsoft.com/office/drawing/2014/main" id="{D8CC3A20-82FB-47C6-B95C-E1E4A891CD73}"/>
+              </a:ext>
+            </a:extLst>
+          </p:cNvPr>
+          <p:cNvSpPr/>
+          <p:nvPr/>
+        </p:nvSpPr>
+        <p:spPr>
+          <a:xfrm>
+            <a:off x="9806626" y="1779596"/>
+            <a:ext cx="1687895" cy="589607"/>
+          </a:xfrm>
+          <a:prstGeom prst="rect">
+            <a:avLst/>
+          </a:prstGeom>
+          <a:solidFill>
+            <a:srgbClr val="00B0F0"/>
+          </a:solidFill>
+          <a:ln w="28575">
+            <a:solidFill>
+              <a:schemeClr val="tx1"/>
+            </a:solidFill>
+          </a:ln>
+        </p:spPr>
+        <p:style>
+          <a:lnRef idx="2">
+            <a:schemeClr val="accent1">
+              <a:shade val="50000"/>
+            </a:schemeClr>
+          </a:lnRef>
+          <a:fillRef idx="1">
+            <a:schemeClr val="accent1"/>
+          </a:fillRef>
+          <a:effectRef idx="0">
+            <a:schemeClr val="accent1"/>
+          </a:effectRef>
+          <a:fontRef idx="minor">
+            <a:schemeClr val="lt1"/>
+          </a:fontRef>
+        </p:style>
+        <p:txBody>
+          <a:bodyPr rtlCol="0" anchor="ctr"/>
+          <a:lstStyle/>
+          <a:p>
+            <a:pPr algn="ctr"/>
+            <a:r>
+              <a:rPr lang="en-SG" b="1" dirty="0">
+                <a:solidFill>
+                  <a:schemeClr val="tx1"/>
+                </a:solidFill>
+              </a:rPr>
+              <a:t>Expenditure</a:t>
+            </a:r>
+          </a:p>
+        </p:txBody>
+      </p:sp>
+      <p:sp>
+        <p:nvSpPr>
+          <p:cNvPr id="12" name="Rectangle 11">
+            <a:extLst>
+              <a:ext uri="{FF2B5EF4-FFF2-40B4-BE49-F238E27FC236}">
+                <a16:creationId xmlns:a16="http://schemas.microsoft.com/office/drawing/2014/main" id="{2F42BE78-5E06-4EA0-9F7C-232E1F759F9D}"/>
+              </a:ext>
+            </a:extLst>
+          </p:cNvPr>
+          <p:cNvSpPr/>
+          <p:nvPr/>
+        </p:nvSpPr>
+        <p:spPr>
+          <a:xfrm>
+            <a:off x="9806626" y="2752353"/>
+            <a:ext cx="1687895" cy="589607"/>
+          </a:xfrm>
+          <a:prstGeom prst="rect">
+            <a:avLst/>
+          </a:prstGeom>
+          <a:solidFill>
+            <a:srgbClr val="00B0F0"/>
+          </a:solidFill>
+          <a:ln w="28575">
+            <a:solidFill>
+              <a:schemeClr val="tx1"/>
+            </a:solidFill>
+          </a:ln>
+        </p:spPr>
+        <p:style>
+          <a:lnRef idx="2">
+            <a:schemeClr val="accent1">
+              <a:shade val="50000"/>
+            </a:schemeClr>
+          </a:lnRef>
+          <a:fillRef idx="1">
+            <a:schemeClr val="accent1"/>
+          </a:fillRef>
+          <a:effectRef idx="0">
+            <a:schemeClr val="accent1"/>
+          </a:effectRef>
+          <a:fontRef idx="minor">
+            <a:schemeClr val="lt1"/>
+          </a:fontRef>
+        </p:style>
+        <p:txBody>
+          <a:bodyPr rtlCol="0" anchor="ctr"/>
+          <a:lstStyle/>
+          <a:p>
+            <a:pPr algn="ctr"/>
+            <a:r>
+              <a:rPr lang="en-SG" b="1" dirty="0">
+                <a:solidFill>
+                  <a:schemeClr val="tx1"/>
+                </a:solidFill>
+              </a:rPr>
+              <a:t>CreditCard</a:t>
+            </a:r>
+          </a:p>
+        </p:txBody>
+      </p:sp>
+      <p:sp>
+        <p:nvSpPr>
+          <p:cNvPr id="14" name="Rectangle 13">
+            <a:extLst>
+              <a:ext uri="{FF2B5EF4-FFF2-40B4-BE49-F238E27FC236}">
+                <a16:creationId xmlns:a16="http://schemas.microsoft.com/office/drawing/2014/main" id="{7A94D05B-882D-4153-B283-23383FC6DB1E}"/>
+              </a:ext>
+            </a:extLst>
+          </p:cNvPr>
+          <p:cNvSpPr/>
+          <p:nvPr/>
+        </p:nvSpPr>
+        <p:spPr>
+          <a:xfrm>
+            <a:off x="9806625" y="3725109"/>
+            <a:ext cx="1687895" cy="589607"/>
+          </a:xfrm>
+          <a:prstGeom prst="rect">
+            <a:avLst/>
+          </a:prstGeom>
+          <a:solidFill>
+            <a:srgbClr val="00B0F0"/>
+          </a:solidFill>
+          <a:ln w="28575">
+            <a:solidFill>
+              <a:schemeClr val="tx1"/>
+            </a:solidFill>
+          </a:ln>
+        </p:spPr>
+        <p:style>
+          <a:lnRef idx="2">
+            <a:schemeClr val="accent1">
+              <a:shade val="50000"/>
+            </a:schemeClr>
+          </a:lnRef>
+          <a:fillRef idx="1">
+            <a:schemeClr val="accent1"/>
+          </a:fillRef>
+          <a:effectRef idx="0">
+            <a:schemeClr val="accent1"/>
+          </a:effectRef>
+          <a:fontRef idx="minor">
+            <a:schemeClr val="lt1"/>
+          </a:fontRef>
+        </p:style>
+        <p:txBody>
+          <a:bodyPr rtlCol="0" anchor="ctr"/>
+          <a:lstStyle/>
+          <a:p>
+            <a:pPr algn="ctr"/>
+            <a:r>
+              <a:rPr lang="en-SG" b="1" dirty="0">
+                <a:solidFill>
+                  <a:schemeClr val="tx1"/>
+                </a:solidFill>
+              </a:rPr>
+              <a:t>Income</a:t>
+            </a:r>
+          </a:p>
+        </p:txBody>
+      </p:sp>
+      <p:cxnSp>
+        <p:nvCxnSpPr>
+          <p:cNvPr id="15" name="Straight Arrow Connector 14">
+            <a:extLst>
+              <a:ext uri="{FF2B5EF4-FFF2-40B4-BE49-F238E27FC236}">
+                <a16:creationId xmlns:a16="http://schemas.microsoft.com/office/drawing/2014/main" id="{D13FA384-E1EB-4F65-A7AA-5C9E9565FBE1}"/>
+              </a:ext>
+            </a:extLst>
+          </p:cNvPr>
+          <p:cNvCxnSpPr>
+            <a:cxnSpLocks/>
+            <a:stCxn id="4" idx="3"/>
+            <a:endCxn id="5" idx="1"/>
+          </p:cNvCxnSpPr>
+          <p:nvPr/>
+        </p:nvCxnSpPr>
+        <p:spPr>
+          <a:xfrm flipV="1">
+            <a:off x="2174528" y="3047158"/>
+            <a:ext cx="944644" cy="1"/>
+          </a:xfrm>
+          <a:prstGeom prst="straightConnector1">
+            <a:avLst/>
+          </a:prstGeom>
+          <a:ln w="28575" cap="flat" cmpd="sng" algn="ctr">
+            <a:solidFill>
+              <a:schemeClr val="dk1"/>
+            </a:solidFill>
+            <a:prstDash val="dash"/>
+            <a:round/>
+            <a:headEnd type="none" w="med" len="med"/>
+            <a:tailEnd type="arrow" w="med" len="med"/>
+          </a:ln>
+        </p:spPr>
+        <p:style>
+          <a:lnRef idx="0">
+            <a:scrgbClr r="0" g="0" b="0"/>
+          </a:lnRef>
+          <a:fillRef idx="0">
+            <a:scrgbClr r="0" g="0" b="0"/>
+          </a:fillRef>
+          <a:effectRef idx="0">
+            <a:scrgbClr r="0" g="0" b="0"/>
+          </a:effectRef>
+          <a:fontRef idx="minor">
+            <a:schemeClr val="tx1"/>
+          </a:fontRef>
+        </p:style>
+      </p:cxnSp>
+      <p:cxnSp>
+        <p:nvCxnSpPr>
+          <p:cNvPr id="18" name="Straight Arrow Connector 17">
+            <a:extLst>
+              <a:ext uri="{FF2B5EF4-FFF2-40B4-BE49-F238E27FC236}">
+                <a16:creationId xmlns:a16="http://schemas.microsoft.com/office/drawing/2014/main" id="{6325CD00-3344-42FF-ADA3-913B6D5F9FD1}"/>
+              </a:ext>
+            </a:extLst>
+          </p:cNvPr>
+          <p:cNvCxnSpPr>
+            <a:cxnSpLocks/>
+            <a:stCxn id="5" idx="3"/>
+            <a:endCxn id="7" idx="1"/>
+          </p:cNvCxnSpPr>
+          <p:nvPr/>
+        </p:nvCxnSpPr>
+        <p:spPr>
+          <a:xfrm>
+            <a:off x="4465602" y="3047158"/>
+            <a:ext cx="760947" cy="0"/>
+          </a:xfrm>
+          <a:prstGeom prst="straightConnector1">
+            <a:avLst/>
+          </a:prstGeom>
+          <a:ln w="28575" cap="flat" cmpd="sng" algn="ctr">
+            <a:solidFill>
+              <a:schemeClr val="dk1"/>
+            </a:solidFill>
+            <a:prstDash val="dash"/>
+            <a:round/>
+            <a:headEnd type="none" w="med" len="med"/>
+            <a:tailEnd type="arrow" w="med" len="med"/>
+          </a:ln>
+        </p:spPr>
+        <p:style>
+          <a:lnRef idx="0">
+            <a:scrgbClr r="0" g="0" b="0"/>
+          </a:lnRef>
+          <a:fillRef idx="0">
+            <a:scrgbClr r="0" g="0" b="0"/>
+          </a:fillRef>
+          <a:effectRef idx="0">
+            <a:scrgbClr r="0" g="0" b="0"/>
+          </a:effectRef>
+          <a:fontRef idx="minor">
+            <a:schemeClr val="tx1"/>
+          </a:fontRef>
+        </p:style>
+      </p:cxnSp>
+      <p:cxnSp>
+        <p:nvCxnSpPr>
+          <p:cNvPr id="21" name="Straight Arrow Connector 20">
+            <a:extLst>
+              <a:ext uri="{FF2B5EF4-FFF2-40B4-BE49-F238E27FC236}">
+                <a16:creationId xmlns:a16="http://schemas.microsoft.com/office/drawing/2014/main" id="{5B0501F0-915F-4940-832E-5CCE72277B36}"/>
+              </a:ext>
+            </a:extLst>
+          </p:cNvPr>
+          <p:cNvCxnSpPr>
+            <a:cxnSpLocks/>
+            <a:stCxn id="5" idx="2"/>
+            <a:endCxn id="6" idx="0"/>
+          </p:cNvCxnSpPr>
+          <p:nvPr/>
+        </p:nvCxnSpPr>
+        <p:spPr>
+          <a:xfrm>
+            <a:off x="3792387" y="3341961"/>
+            <a:ext cx="11144" cy="671146"/>
+          </a:xfrm>
+          <a:prstGeom prst="straightConnector1">
+            <a:avLst/>
+          </a:prstGeom>
+          <a:ln w="28575" cap="flat" cmpd="sng" algn="ctr">
+            <a:solidFill>
+              <a:schemeClr val="dk1"/>
+            </a:solidFill>
+            <a:prstDash val="dash"/>
+            <a:round/>
+            <a:headEnd type="none" w="med" len="med"/>
+            <a:tailEnd type="arrow" w="med" len="med"/>
+          </a:ln>
+        </p:spPr>
+        <p:style>
+          <a:lnRef idx="0">
+            <a:scrgbClr r="0" g="0" b="0"/>
+          </a:lnRef>
+          <a:fillRef idx="0">
+            <a:scrgbClr r="0" g="0" b="0"/>
+          </a:fillRef>
+          <a:effectRef idx="0">
+            <a:scrgbClr r="0" g="0" b="0"/>
+          </a:effectRef>
+          <a:fontRef idx="minor">
+            <a:schemeClr val="tx1"/>
+          </a:fontRef>
+        </p:style>
+      </p:cxnSp>
+      <p:cxnSp>
+        <p:nvCxnSpPr>
+          <p:cNvPr id="24" name="Straight Arrow Connector 23">
+            <a:extLst>
+              <a:ext uri="{FF2B5EF4-FFF2-40B4-BE49-F238E27FC236}">
+                <a16:creationId xmlns:a16="http://schemas.microsoft.com/office/drawing/2014/main" id="{8D11F399-540F-4A0A-A732-8D55EB527A26}"/>
+              </a:ext>
+            </a:extLst>
+          </p:cNvPr>
+          <p:cNvCxnSpPr>
+            <a:cxnSpLocks/>
+            <a:stCxn id="7" idx="3"/>
+            <a:endCxn id="9" idx="1"/>
+          </p:cNvCxnSpPr>
+          <p:nvPr/>
+        </p:nvCxnSpPr>
+        <p:spPr>
+          <a:xfrm flipV="1">
+            <a:off x="6572979" y="3047157"/>
+            <a:ext cx="843945" cy="1"/>
+          </a:xfrm>
+          <a:prstGeom prst="straightConnector1">
+            <a:avLst/>
+          </a:prstGeom>
+          <a:ln w="28575">
+            <a:headEnd type="none" w="med" len="med"/>
+            <a:tailEnd type="arrow" w="med" len="med"/>
+          </a:ln>
+        </p:spPr>
+        <p:style>
+          <a:lnRef idx="1">
+            <a:schemeClr val="dk1"/>
+          </a:lnRef>
+          <a:fillRef idx="0">
+            <a:schemeClr val="dk1"/>
+          </a:fillRef>
+          <a:effectRef idx="0">
+            <a:schemeClr val="dk1"/>
+          </a:effectRef>
+          <a:fontRef idx="minor">
+            <a:schemeClr val="tx1"/>
+          </a:fontRef>
+        </p:style>
+      </p:cxnSp>
+      <p:cxnSp>
+        <p:nvCxnSpPr>
+          <p:cNvPr id="29" name="Straight Arrow Connector 28">
+            <a:extLst>
+              <a:ext uri="{FF2B5EF4-FFF2-40B4-BE49-F238E27FC236}">
+                <a16:creationId xmlns:a16="http://schemas.microsoft.com/office/drawing/2014/main" id="{F19F8B28-1D29-45D4-A1F6-6B46428210DD}"/>
+              </a:ext>
+            </a:extLst>
+          </p:cNvPr>
+          <p:cNvCxnSpPr>
+            <a:cxnSpLocks/>
+            <a:stCxn id="9" idx="3"/>
+            <a:endCxn id="12" idx="1"/>
+          </p:cNvCxnSpPr>
+          <p:nvPr/>
+        </p:nvCxnSpPr>
+        <p:spPr>
+          <a:xfrm>
+            <a:off x="9194323" y="3047157"/>
+            <a:ext cx="612303" cy="0"/>
+          </a:xfrm>
+          <a:prstGeom prst="straightConnector1">
+            <a:avLst/>
+          </a:prstGeom>
+          <a:ln w="28575" cap="flat" cmpd="sng" algn="ctr">
+            <a:solidFill>
+              <a:schemeClr val="dk1"/>
+            </a:solidFill>
+            <a:prstDash val="dash"/>
+            <a:round/>
+            <a:headEnd type="none" w="med" len="med"/>
+            <a:tailEnd type="arrow" w="med" len="med"/>
+          </a:ln>
+        </p:spPr>
+        <p:style>
+          <a:lnRef idx="0">
+            <a:scrgbClr r="0" g="0" b="0"/>
+          </a:lnRef>
+          <a:fillRef idx="0">
+            <a:scrgbClr r="0" g="0" b="0"/>
+          </a:fillRef>
+          <a:effectRef idx="0">
+            <a:scrgbClr r="0" g="0" b="0"/>
+          </a:effectRef>
+          <a:fontRef idx="minor">
+            <a:schemeClr val="tx1"/>
+          </a:fontRef>
+        </p:style>
+      </p:cxnSp>
+      <p:cxnSp>
+        <p:nvCxnSpPr>
+          <p:cNvPr id="32" name="Connector: Elbow 31">
+            <a:extLst>
+              <a:ext uri="{FF2B5EF4-FFF2-40B4-BE49-F238E27FC236}">
+                <a16:creationId xmlns:a16="http://schemas.microsoft.com/office/drawing/2014/main" id="{9AC76DF4-FBCB-4E37-BB81-2830B6B344F3}"/>
+              </a:ext>
+            </a:extLst>
+          </p:cNvPr>
+          <p:cNvCxnSpPr>
+            <a:cxnSpLocks/>
+            <a:stCxn id="7" idx="0"/>
+            <a:endCxn id="8" idx="1"/>
+          </p:cNvCxnSpPr>
+          <p:nvPr/>
+        </p:nvCxnSpPr>
+        <p:spPr>
+          <a:xfrm rot="5400000" flipH="1" flipV="1">
+            <a:off x="6319368" y="1654798"/>
+            <a:ext cx="677953" cy="1517160"/>
+          </a:xfrm>
+          <a:prstGeom prst="bentConnector2">
+            <a:avLst/>
+          </a:prstGeom>
+          <a:ln w="28575">
+            <a:headEnd type="none" w="med" len="med"/>
+            <a:tailEnd type="arrow" w="med" len="med"/>
+          </a:ln>
+        </p:spPr>
+        <p:style>
+          <a:lnRef idx="1">
+            <a:schemeClr val="dk1"/>
+          </a:lnRef>
+          <a:fillRef idx="0">
+            <a:schemeClr val="dk1"/>
+          </a:fillRef>
+          <a:effectRef idx="0">
+            <a:schemeClr val="dk1"/>
+          </a:effectRef>
+          <a:fontRef idx="minor">
+            <a:schemeClr val="tx1"/>
+          </a:fontRef>
+        </p:style>
+      </p:cxnSp>
+      <p:cxnSp>
+        <p:nvCxnSpPr>
+          <p:cNvPr id="35" name="Straight Arrow Connector 34">
+            <a:extLst>
+              <a:ext uri="{FF2B5EF4-FFF2-40B4-BE49-F238E27FC236}">
+                <a16:creationId xmlns:a16="http://schemas.microsoft.com/office/drawing/2014/main" id="{DE1709DE-F3F1-46CC-B855-9F666B8C5516}"/>
+              </a:ext>
+            </a:extLst>
+          </p:cNvPr>
+          <p:cNvCxnSpPr>
+            <a:cxnSpLocks/>
+            <a:stCxn id="8" idx="3"/>
+            <a:endCxn id="11" idx="1"/>
+          </p:cNvCxnSpPr>
+          <p:nvPr/>
+        </p:nvCxnSpPr>
+        <p:spPr>
+          <a:xfrm flipV="1">
+            <a:off x="9194323" y="2074400"/>
+            <a:ext cx="612303" cy="1"/>
+          </a:xfrm>
+          <a:prstGeom prst="straightConnector1">
+            <a:avLst/>
+          </a:prstGeom>
+          <a:ln w="28575" cap="flat" cmpd="sng" algn="ctr">
+            <a:solidFill>
+              <a:schemeClr val="dk1"/>
+            </a:solidFill>
+            <a:prstDash val="dash"/>
+            <a:round/>
+            <a:headEnd type="none" w="med" len="med"/>
+            <a:tailEnd type="arrow" w="med" len="med"/>
+          </a:ln>
+        </p:spPr>
+        <p:style>
+          <a:lnRef idx="0">
+            <a:scrgbClr r="0" g="0" b="0"/>
+          </a:lnRef>
+          <a:fillRef idx="0">
+            <a:scrgbClr r="0" g="0" b="0"/>
+          </a:fillRef>
+          <a:effectRef idx="0">
+            <a:scrgbClr r="0" g="0" b="0"/>
+          </a:effectRef>
+          <a:fontRef idx="minor">
+            <a:schemeClr val="tx1"/>
+          </a:fontRef>
+        </p:style>
+      </p:cxnSp>
+      <p:cxnSp>
+        <p:nvCxnSpPr>
+          <p:cNvPr id="36" name="Straight Arrow Connector 35">
+            <a:extLst>
+              <a:ext uri="{FF2B5EF4-FFF2-40B4-BE49-F238E27FC236}">
+                <a16:creationId xmlns:a16="http://schemas.microsoft.com/office/drawing/2014/main" id="{7EFC39FB-8E12-40AC-B11A-A87597144BA1}"/>
+              </a:ext>
+            </a:extLst>
+          </p:cNvPr>
+          <p:cNvCxnSpPr>
+            <a:cxnSpLocks/>
+            <a:stCxn id="10" idx="3"/>
+            <a:endCxn id="14" idx="1"/>
+          </p:cNvCxnSpPr>
+          <p:nvPr/>
+        </p:nvCxnSpPr>
+        <p:spPr>
+          <a:xfrm>
+            <a:off x="9194323" y="4019913"/>
+            <a:ext cx="612302" cy="0"/>
+          </a:xfrm>
+          <a:prstGeom prst="straightConnector1">
+            <a:avLst/>
+          </a:prstGeom>
+          <a:ln w="28575" cap="flat" cmpd="sng" algn="ctr">
+            <a:solidFill>
+              <a:schemeClr val="dk1"/>
+            </a:solidFill>
+            <a:prstDash val="dash"/>
+            <a:round/>
+            <a:headEnd type="none" w="med" len="med"/>
+            <a:tailEnd type="arrow" w="med" len="med"/>
+          </a:ln>
+        </p:spPr>
+        <p:style>
+          <a:lnRef idx="0">
+            <a:scrgbClr r="0" g="0" b="0"/>
+          </a:lnRef>
+          <a:fillRef idx="0">
+            <a:scrgbClr r="0" g="0" b="0"/>
+          </a:fillRef>
+          <a:effectRef idx="0">
+            <a:scrgbClr r="0" g="0" b="0"/>
+          </a:effectRef>
+          <a:fontRef idx="minor">
+            <a:schemeClr val="tx1"/>
+          </a:fontRef>
+        </p:style>
+      </p:cxnSp>
+      <p:cxnSp>
+        <p:nvCxnSpPr>
+          <p:cNvPr id="41" name="Connector: Elbow 40">
+            <a:extLst>
+              <a:ext uri="{FF2B5EF4-FFF2-40B4-BE49-F238E27FC236}">
+                <a16:creationId xmlns:a16="http://schemas.microsoft.com/office/drawing/2014/main" id="{2AD41003-F8A3-4E54-A4B1-FB6BFF46374B}"/>
+              </a:ext>
+            </a:extLst>
+          </p:cNvPr>
+          <p:cNvCxnSpPr>
+            <a:cxnSpLocks/>
+            <a:stCxn id="7" idx="2"/>
+            <a:endCxn id="10" idx="1"/>
+          </p:cNvCxnSpPr>
+          <p:nvPr/>
+        </p:nvCxnSpPr>
+        <p:spPr>
+          <a:xfrm rot="16200000" flipH="1">
+            <a:off x="6319368" y="2922357"/>
+            <a:ext cx="677952" cy="1517160"/>
+          </a:xfrm>
+          <a:prstGeom prst="bentConnector2">
+            <a:avLst/>
+          </a:prstGeom>
+          <a:ln w="28575">
+            <a:headEnd type="none" w="med" len="med"/>
+            <a:tailEnd type="arrow" w="med" len="med"/>
+          </a:ln>
+        </p:spPr>
+        <p:style>
+          <a:lnRef idx="1">
+            <a:schemeClr val="dk1"/>
+          </a:lnRef>
+          <a:fillRef idx="0">
+            <a:schemeClr val="dk1"/>
+          </a:fillRef>
+          <a:effectRef idx="0">
+            <a:schemeClr val="dk1"/>
+          </a:effectRef>
+          <a:fontRef idx="minor">
+            <a:schemeClr val="tx1"/>
+          </a:fontRef>
+        </p:style>
+      </p:cxnSp>
+      <p:sp>
+        <p:nvSpPr>
+          <p:cNvPr id="44" name="Rectangle 43">
+            <a:extLst>
+              <a:ext uri="{FF2B5EF4-FFF2-40B4-BE49-F238E27FC236}">
+                <a16:creationId xmlns:a16="http://schemas.microsoft.com/office/drawing/2014/main" id="{5DDCC0D1-C129-4302-BC9A-B9665E58B2AB}"/>
+              </a:ext>
+            </a:extLst>
+          </p:cNvPr>
+          <p:cNvSpPr/>
+          <p:nvPr/>
+        </p:nvSpPr>
+        <p:spPr>
+          <a:xfrm>
+            <a:off x="2891609" y="1578635"/>
+            <a:ext cx="8762677" cy="3252157"/>
+          </a:xfrm>
+          <a:prstGeom prst="rect">
+            <a:avLst/>
+          </a:prstGeom>
+          <a:noFill/>
+          <a:ln w="28575">
+            <a:solidFill>
+              <a:schemeClr val="tx1"/>
+            </a:solidFill>
+          </a:ln>
+        </p:spPr>
+        <p:style>
+          <a:lnRef idx="2">
+            <a:schemeClr val="accent1">
+              <a:shade val="50000"/>
+            </a:schemeClr>
+          </a:lnRef>
+          <a:fillRef idx="1">
+            <a:schemeClr val="accent1"/>
+          </a:fillRef>
+          <a:effectRef idx="0">
+            <a:schemeClr val="accent1"/>
+          </a:effectRef>
+          <a:fontRef idx="minor">
+            <a:schemeClr val="lt1"/>
+          </a:fontRef>
+        </p:style>
+        <p:txBody>
+          <a:bodyPr rtlCol="0" anchor="ctr"/>
+          <a:lstStyle/>
+          <a:p>
+            <a:pPr algn="ctr"/>
+            <a:endParaRPr lang="en-SG"/>
+          </a:p>
+        </p:txBody>
+      </p:sp>
+      <p:sp>
+        <p:nvSpPr>
+          <p:cNvPr id="45" name="TextBox 44">
+            <a:extLst>
+              <a:ext uri="{FF2B5EF4-FFF2-40B4-BE49-F238E27FC236}">
+                <a16:creationId xmlns:a16="http://schemas.microsoft.com/office/drawing/2014/main" id="{FBF4A06F-D7DD-4C53-AE5C-DDC0CECD0802}"/>
+              </a:ext>
+            </a:extLst>
+          </p:cNvPr>
+          <p:cNvSpPr txBox="1"/>
+          <p:nvPr/>
+        </p:nvSpPr>
+        <p:spPr>
+          <a:xfrm>
+            <a:off x="10597163" y="1165613"/>
+            <a:ext cx="1057123" cy="461665"/>
+          </a:xfrm>
+          <a:prstGeom prst="rect">
+            <a:avLst/>
+          </a:prstGeom>
+          <a:noFill/>
+        </p:spPr>
+        <p:txBody>
+          <a:bodyPr wrap="square" rtlCol="0">
+            <a:spAutoFit/>
+          </a:bodyPr>
+          <a:lstStyle/>
+          <a:p>
+            <a:r>
+              <a:rPr lang="en-SG" sz="2400" dirty="0"/>
+              <a:t>Parser</a:t>
+            </a:r>
+          </a:p>
+        </p:txBody>
+      </p:sp>
+      <p:sp>
+        <p:nvSpPr>
+          <p:cNvPr id="48" name="Isosceles Triangle 47">
+            <a:extLst>
+              <a:ext uri="{FF2B5EF4-FFF2-40B4-BE49-F238E27FC236}">
+                <a16:creationId xmlns:a16="http://schemas.microsoft.com/office/drawing/2014/main" id="{01FE9099-C48A-45AB-8A08-87144D9FE5E9}"/>
+              </a:ext>
+            </a:extLst>
+          </p:cNvPr>
+          <p:cNvSpPr/>
+          <p:nvPr/>
+        </p:nvSpPr>
+        <p:spPr>
+          <a:xfrm rot="10800000">
+            <a:off x="4349135" y="3585573"/>
+            <a:ext cx="132177" cy="102384"/>
+          </a:xfrm>
+          <a:prstGeom prst="triangle">
+            <a:avLst/>
+          </a:prstGeom>
+          <a:solidFill>
+            <a:schemeClr val="tx1"/>
+          </a:solidFill>
+          <a:ln>
+            <a:solidFill>
+              <a:schemeClr val="tx1"/>
+            </a:solidFill>
+          </a:ln>
+        </p:spPr>
+        <p:style>
+          <a:lnRef idx="2">
+            <a:schemeClr val="accent1">
+              <a:shade val="50000"/>
+            </a:schemeClr>
+          </a:lnRef>
+          <a:fillRef idx="1">
+            <a:schemeClr val="accent1"/>
+          </a:fillRef>
+          <a:effectRef idx="0">
+            <a:schemeClr val="accent1"/>
+          </a:effectRef>
+          <a:fontRef idx="minor">
+            <a:schemeClr val="lt1"/>
+          </a:fontRef>
+        </p:style>
+        <p:txBody>
+          <a:bodyPr rtlCol="0" anchor="ctr"/>
+          <a:lstStyle/>
+          <a:p>
+            <a:pPr algn="ctr"/>
+            <a:endParaRPr lang="en-SG"/>
+          </a:p>
+        </p:txBody>
+      </p:sp>
+      <p:sp>
+        <p:nvSpPr>
+          <p:cNvPr id="49" name="TextBox 48">
+            <a:extLst>
+              <a:ext uri="{FF2B5EF4-FFF2-40B4-BE49-F238E27FC236}">
+                <a16:creationId xmlns:a16="http://schemas.microsoft.com/office/drawing/2014/main" id="{6765C34A-1013-4FC8-AEF4-0A51172C009A}"/>
+              </a:ext>
+            </a:extLst>
+          </p:cNvPr>
+          <p:cNvSpPr txBox="1"/>
+          <p:nvPr/>
+        </p:nvSpPr>
+        <p:spPr>
+          <a:xfrm>
+            <a:off x="3799935" y="3437197"/>
+            <a:ext cx="680407" cy="369332"/>
+          </a:xfrm>
+          <a:prstGeom prst="rect">
+            <a:avLst/>
+          </a:prstGeom>
+          <a:noFill/>
+        </p:spPr>
+        <p:txBody>
+          <a:bodyPr wrap="square" rtlCol="0">
+            <a:spAutoFit/>
+          </a:bodyPr>
+          <a:lstStyle/>
+          <a:p>
+            <a:r>
+              <a:rPr lang="en-SG" dirty="0"/>
+              <a:t>uses</a:t>
+            </a:r>
+          </a:p>
+        </p:txBody>
+      </p:sp>
+      <p:sp>
+        <p:nvSpPr>
+          <p:cNvPr id="50" name="TextBox 49">
+            <a:extLst>
+              <a:ext uri="{FF2B5EF4-FFF2-40B4-BE49-F238E27FC236}">
+                <a16:creationId xmlns:a16="http://schemas.microsoft.com/office/drawing/2014/main" id="{9C744499-7E1F-451B-A5F3-0CA9C615314E}"/>
+              </a:ext>
+            </a:extLst>
+          </p:cNvPr>
+          <p:cNvSpPr txBox="1"/>
+          <p:nvPr/>
+        </p:nvSpPr>
+        <p:spPr>
+          <a:xfrm>
+            <a:off x="6863212" y="1742333"/>
+            <a:ext cx="542013" cy="369332"/>
+          </a:xfrm>
+          <a:prstGeom prst="rect">
+            <a:avLst/>
+          </a:prstGeom>
+          <a:noFill/>
+        </p:spPr>
+        <p:txBody>
+          <a:bodyPr wrap="square" rtlCol="0">
+            <a:spAutoFit/>
+          </a:bodyPr>
+          <a:lstStyle/>
+          <a:p>
+            <a:r>
+              <a:rPr lang="en-SG" dirty="0"/>
+              <a:t>0..1</a:t>
+            </a:r>
+          </a:p>
+        </p:txBody>
+      </p:sp>
+      <p:sp>
+        <p:nvSpPr>
+          <p:cNvPr id="51" name="TextBox 50">
+            <a:extLst>
+              <a:ext uri="{FF2B5EF4-FFF2-40B4-BE49-F238E27FC236}">
+                <a16:creationId xmlns:a16="http://schemas.microsoft.com/office/drawing/2014/main" id="{FE75D384-C2CB-41C2-A2E4-EC01354DD9C7}"/>
+              </a:ext>
+            </a:extLst>
+          </p:cNvPr>
+          <p:cNvSpPr txBox="1"/>
+          <p:nvPr/>
+        </p:nvSpPr>
+        <p:spPr>
+          <a:xfrm>
+            <a:off x="6858396" y="2715090"/>
+            <a:ext cx="542013" cy="369332"/>
+          </a:xfrm>
+          <a:prstGeom prst="rect">
+            <a:avLst/>
+          </a:prstGeom>
+          <a:noFill/>
+        </p:spPr>
+        <p:txBody>
+          <a:bodyPr wrap="square" rtlCol="0">
+            <a:spAutoFit/>
+          </a:bodyPr>
+          <a:lstStyle/>
+          <a:p>
+            <a:r>
+              <a:rPr lang="en-SG" dirty="0"/>
+              <a:t>0..1</a:t>
+            </a:r>
+          </a:p>
+        </p:txBody>
+      </p:sp>
+      <p:sp>
+        <p:nvSpPr>
+          <p:cNvPr id="52" name="TextBox 51">
+            <a:extLst>
+              <a:ext uri="{FF2B5EF4-FFF2-40B4-BE49-F238E27FC236}">
+                <a16:creationId xmlns:a16="http://schemas.microsoft.com/office/drawing/2014/main" id="{348E0653-0367-4E2B-B05E-357BBE1C3292}"/>
+              </a:ext>
+            </a:extLst>
+          </p:cNvPr>
+          <p:cNvSpPr txBox="1"/>
+          <p:nvPr/>
+        </p:nvSpPr>
+        <p:spPr>
+          <a:xfrm>
+            <a:off x="6863150" y="3690528"/>
+            <a:ext cx="542013" cy="369332"/>
+          </a:xfrm>
+          <a:prstGeom prst="rect">
+            <a:avLst/>
+          </a:prstGeom>
+          <a:noFill/>
+        </p:spPr>
+        <p:txBody>
+          <a:bodyPr wrap="square" rtlCol="0">
+            <a:spAutoFit/>
+          </a:bodyPr>
+          <a:lstStyle/>
+          <a:p>
+            <a:r>
+              <a:rPr lang="en-SG" dirty="0"/>
+              <a:t>0..1</a:t>
+            </a:r>
+          </a:p>
+        </p:txBody>
+      </p:sp>
+      <p:sp>
+        <p:nvSpPr>
+          <p:cNvPr id="53" name="Isosceles Triangle 52">
+            <a:extLst>
+              <a:ext uri="{FF2B5EF4-FFF2-40B4-BE49-F238E27FC236}">
+                <a16:creationId xmlns:a16="http://schemas.microsoft.com/office/drawing/2014/main" id="{6D1F8BE5-89D9-42F2-9CD5-A205851315EC}"/>
+              </a:ext>
+            </a:extLst>
+          </p:cNvPr>
+          <p:cNvSpPr/>
+          <p:nvPr/>
+        </p:nvSpPr>
+        <p:spPr>
+          <a:xfrm rot="5400000">
+            <a:off x="6463600" y="1869111"/>
+            <a:ext cx="132177" cy="102384"/>
+          </a:xfrm>
+          <a:prstGeom prst="triangle">
+            <a:avLst/>
+          </a:prstGeom>
+          <a:solidFill>
+            <a:schemeClr val="tx1"/>
+          </a:solidFill>
+          <a:ln>
+            <a:solidFill>
+              <a:schemeClr val="tx1"/>
+            </a:solidFill>
+          </a:ln>
+        </p:spPr>
+        <p:style>
+          <a:lnRef idx="2">
+            <a:schemeClr val="accent1">
+              <a:shade val="50000"/>
+            </a:schemeClr>
+          </a:lnRef>
+          <a:fillRef idx="1">
+            <a:schemeClr val="accent1"/>
+          </a:fillRef>
+          <a:effectRef idx="0">
+            <a:schemeClr val="accent1"/>
+          </a:effectRef>
+          <a:fontRef idx="minor">
+            <a:schemeClr val="lt1"/>
+          </a:fontRef>
+        </p:style>
+        <p:txBody>
+          <a:bodyPr rtlCol="0" anchor="ctr"/>
+          <a:lstStyle/>
+          <a:p>
+            <a:pPr algn="ctr"/>
+            <a:endParaRPr lang="en-SG"/>
+          </a:p>
+        </p:txBody>
+      </p:sp>
+      <p:sp>
+        <p:nvSpPr>
+          <p:cNvPr id="54" name="Isosceles Triangle 53">
+            <a:extLst>
+              <a:ext uri="{FF2B5EF4-FFF2-40B4-BE49-F238E27FC236}">
+                <a16:creationId xmlns:a16="http://schemas.microsoft.com/office/drawing/2014/main" id="{D6D150FB-CD36-40F4-B4D1-C04CE5E5A8EE}"/>
+              </a:ext>
+            </a:extLst>
+          </p:cNvPr>
+          <p:cNvSpPr/>
+          <p:nvPr/>
+        </p:nvSpPr>
+        <p:spPr>
+          <a:xfrm rot="5400000">
+            <a:off x="6463600" y="4097490"/>
+            <a:ext cx="132177" cy="102384"/>
+          </a:xfrm>
+          <a:prstGeom prst="triangle">
+            <a:avLst/>
+          </a:prstGeom>
+          <a:solidFill>
+            <a:schemeClr val="tx1"/>
+          </a:solidFill>
+          <a:ln>
+            <a:solidFill>
+              <a:schemeClr val="tx1"/>
+            </a:solidFill>
+          </a:ln>
+        </p:spPr>
+        <p:style>
+          <a:lnRef idx="2">
+            <a:schemeClr val="accent1">
+              <a:shade val="50000"/>
+            </a:schemeClr>
+          </a:lnRef>
+          <a:fillRef idx="1">
+            <a:schemeClr val="accent1"/>
+          </a:fillRef>
+          <a:effectRef idx="0">
+            <a:schemeClr val="accent1"/>
+          </a:effectRef>
+          <a:fontRef idx="minor">
+            <a:schemeClr val="lt1"/>
+          </a:fontRef>
+        </p:style>
+        <p:txBody>
+          <a:bodyPr rtlCol="0" anchor="ctr"/>
+          <a:lstStyle/>
+          <a:p>
+            <a:pPr algn="ctr"/>
+            <a:endParaRPr lang="en-SG"/>
+          </a:p>
+        </p:txBody>
+      </p:sp>
+      <p:sp>
+        <p:nvSpPr>
+          <p:cNvPr id="55" name="Isosceles Triangle 54">
+            <a:extLst>
+              <a:ext uri="{FF2B5EF4-FFF2-40B4-BE49-F238E27FC236}">
+                <a16:creationId xmlns:a16="http://schemas.microsoft.com/office/drawing/2014/main" id="{018AA557-83D1-434E-9A52-B1D7285C17F2}"/>
+              </a:ext>
+            </a:extLst>
+          </p:cNvPr>
+          <p:cNvSpPr/>
+          <p:nvPr/>
+        </p:nvSpPr>
+        <p:spPr>
+          <a:xfrm rot="5400000">
+            <a:off x="7119193" y="3152684"/>
+            <a:ext cx="132177" cy="102384"/>
+          </a:xfrm>
+          <a:prstGeom prst="triangle">
+            <a:avLst/>
+          </a:prstGeom>
+          <a:solidFill>
+            <a:schemeClr val="tx1"/>
+          </a:solidFill>
+          <a:ln>
+            <a:solidFill>
+              <a:schemeClr val="tx1"/>
+            </a:solidFill>
+          </a:ln>
+        </p:spPr>
+        <p:style>
+          <a:lnRef idx="2">
+            <a:schemeClr val="accent1">
+              <a:shade val="50000"/>
+            </a:schemeClr>
+          </a:lnRef>
+          <a:fillRef idx="1">
+            <a:schemeClr val="accent1"/>
+          </a:fillRef>
+          <a:effectRef idx="0">
+            <a:schemeClr val="accent1"/>
+          </a:effectRef>
+          <a:fontRef idx="minor">
+            <a:schemeClr val="lt1"/>
+          </a:fontRef>
+        </p:style>
+        <p:txBody>
+          <a:bodyPr rtlCol="0" anchor="ctr"/>
+          <a:lstStyle/>
+          <a:p>
+            <a:pPr algn="ctr"/>
+            <a:endParaRPr lang="en-SG"/>
+          </a:p>
+        </p:txBody>
+      </p:sp>
+      <p:sp>
+        <p:nvSpPr>
+          <p:cNvPr id="56" name="TextBox 55">
+            <a:extLst>
+              <a:ext uri="{FF2B5EF4-FFF2-40B4-BE49-F238E27FC236}">
+                <a16:creationId xmlns:a16="http://schemas.microsoft.com/office/drawing/2014/main" id="{EFD957B8-A7B6-4321-BC23-E5BAFB964083}"/>
+              </a:ext>
+            </a:extLst>
+          </p:cNvPr>
+          <p:cNvSpPr txBox="1"/>
+          <p:nvPr/>
+        </p:nvSpPr>
+        <p:spPr>
+          <a:xfrm>
+            <a:off x="5977937" y="1705067"/>
+            <a:ext cx="680407" cy="369332"/>
+          </a:xfrm>
+          <a:prstGeom prst="rect">
+            <a:avLst/>
+          </a:prstGeom>
+          <a:noFill/>
+        </p:spPr>
+        <p:txBody>
+          <a:bodyPr wrap="square" rtlCol="0">
+            <a:spAutoFit/>
+          </a:bodyPr>
+          <a:lstStyle/>
+          <a:p>
+            <a:r>
+              <a:rPr lang="en-SG" dirty="0"/>
+              <a:t>has</a:t>
+            </a:r>
+          </a:p>
+        </p:txBody>
+      </p:sp>
+      <p:sp>
+        <p:nvSpPr>
+          <p:cNvPr id="57" name="TextBox 56">
+            <a:extLst>
+              <a:ext uri="{FF2B5EF4-FFF2-40B4-BE49-F238E27FC236}">
+                <a16:creationId xmlns:a16="http://schemas.microsoft.com/office/drawing/2014/main" id="{5F01E48C-0ACB-49D4-A54E-4F99FA6A6790}"/>
+              </a:ext>
+            </a:extLst>
+          </p:cNvPr>
+          <p:cNvSpPr txBox="1"/>
+          <p:nvPr/>
+        </p:nvSpPr>
+        <p:spPr>
+          <a:xfrm>
+            <a:off x="5977936" y="3964016"/>
+            <a:ext cx="680407" cy="369332"/>
+          </a:xfrm>
+          <a:prstGeom prst="rect">
+            <a:avLst/>
+          </a:prstGeom>
+          <a:noFill/>
+        </p:spPr>
+        <p:txBody>
+          <a:bodyPr wrap="square" rtlCol="0">
+            <a:spAutoFit/>
+          </a:bodyPr>
+          <a:lstStyle/>
+          <a:p>
+            <a:r>
+              <a:rPr lang="en-SG" dirty="0"/>
+              <a:t>has</a:t>
+            </a:r>
+          </a:p>
+        </p:txBody>
+      </p:sp>
+      <p:sp>
+        <p:nvSpPr>
+          <p:cNvPr id="58" name="TextBox 57">
+            <a:extLst>
+              <a:ext uri="{FF2B5EF4-FFF2-40B4-BE49-F238E27FC236}">
+                <a16:creationId xmlns:a16="http://schemas.microsoft.com/office/drawing/2014/main" id="{8C5A8CE5-34E3-4CA2-9CE6-2CAB0AE26573}"/>
+              </a:ext>
+            </a:extLst>
+          </p:cNvPr>
+          <p:cNvSpPr txBox="1"/>
+          <p:nvPr/>
+        </p:nvSpPr>
+        <p:spPr>
+          <a:xfrm>
+            <a:off x="6625459" y="3020552"/>
+            <a:ext cx="507919" cy="369332"/>
+          </a:xfrm>
+          <a:prstGeom prst="rect">
+            <a:avLst/>
+          </a:prstGeom>
+          <a:noFill/>
+        </p:spPr>
+        <p:txBody>
+          <a:bodyPr wrap="square" rtlCol="0">
+            <a:spAutoFit/>
+          </a:bodyPr>
+          <a:lstStyle/>
+          <a:p>
+            <a:r>
+              <a:rPr lang="en-SG" dirty="0"/>
+              <a:t>has</a:t>
+            </a:r>
+          </a:p>
+        </p:txBody>
+      </p:sp>
+    </p:spTree>
+    <p:extLst>
+      <p:ext uri="{BB962C8B-B14F-4D97-AF65-F5344CB8AC3E}">
+        <p14:creationId xmlns:p14="http://schemas.microsoft.com/office/powerpoint/2010/main" val="1924442383"/>
+      </p:ext>
+    </p:extLst>
+  </p:cSld>
+  <p:clrMapOvr>
+    <a:masterClrMapping/>
+  </p:clrMapOvr>
+</p:sld>
+</file>
+
+<file path=ppt/slides/slide6.xml><?xml version="1.0" encoding="utf-8"?>
+<p:sld xmlns:a="http://schemas.openxmlformats.org/drawingml/2006/main" xmlns:r="http://schemas.openxmlformats.org/officeDocument/2006/relationships" xmlns:p="http://schemas.openxmlformats.org/presentationml/2006/main">
+  <p:cSld>
+    <p:spTree>
+      <p:nvGrpSpPr>
+        <p:cNvPr id="1" name=""/>
+        <p:cNvGrpSpPr/>
+        <p:nvPr/>
+      </p:nvGrpSpPr>
+      <p:grpSpPr>
+        <a:xfrm>
+          <a:off x="0" y="0"/>
+          <a:ext cx="0" cy="0"/>
+          <a:chOff x="0" y="0"/>
+          <a:chExt cx="0" cy="0"/>
+        </a:xfrm>
+      </p:grpSpPr>
+      <p:sp>
+        <p:nvSpPr>
           <p:cNvPr id="2" name="Title 1">
             <a:extLst>
               <a:ext uri="{FF2B5EF4-FFF2-40B4-BE49-F238E27FC236}">
@@ -9208,7 +10851,7 @@
 </p:sld>
 </file>
 
-<file path=ppt/slides/slide6.xml><?xml version="1.0" encoding="utf-8"?>
+<file path=ppt/slides/slide7.xml><?xml version="1.0" encoding="utf-8"?>
 <p:sld xmlns:a="http://schemas.openxmlformats.org/drawingml/2006/main" xmlns:r="http://schemas.openxmlformats.org/officeDocument/2006/relationships" xmlns:p="http://schemas.openxmlformats.org/presentationml/2006/main">
   <p:cSld>
     <p:spTree>
@@ -9694,13 +11337,8 @@
                     <a:p>
                       <a:r>
                         <a:rPr lang="en-SG" dirty="0"/>
-                        <a:t>+ load: </a:t>
+                        <a:t>+ load: ExpenditureList</a:t>
                       </a:r>
-                      <a:r>
-                        <a:rPr lang="en-SG" dirty="0" err="1"/>
-                        <a:t>ExpenditureList</a:t>
-                      </a:r>
-                      <a:endParaRPr lang="en-SG" dirty="0"/>
                     </a:p>
                     <a:p>
                       <a:r>
@@ -9713,15 +11351,7 @@
                       </a:r>
                       <a:r>
                         <a:rPr lang="en-SG" dirty="0"/>
-                        <a:t>: </a:t>
-                      </a:r>
-                      <a:r>
-                        <a:rPr lang="en-SG" dirty="0" err="1"/>
-                        <a:t>ExpenditureList</a:t>
-                      </a:r>
-                      <a:r>
-                        <a:rPr lang="en-SG" dirty="0"/>
-                        <a:t>): void</a:t>
+                        <a:t>: ExpenditureList): void</a:t>
                       </a:r>
                     </a:p>
                   </a:txBody>

</xml_diff>